<commit_message>
Added Memento pattern presentation, slight modification of Session
</commit_message>
<xml_diff>
--- a/Project Pink/doc/tasks/task13/Memento Pattern.pptx
+++ b/Project Pink/doc/tasks/task13/Memento Pattern.pptx
@@ -5,7 +5,7 @@
     <p:sldMasterId id="2147483660" r:id="rId1"/>
   </p:sldMasterIdLst>
   <p:notesMasterIdLst>
-    <p:notesMasterId r:id="rId17"/>
+    <p:notesMasterId r:id="rId18"/>
   </p:notesMasterIdLst>
   <p:sldIdLst>
     <p:sldId id="256" r:id="rId2"/>
@@ -21,8 +21,9 @@
     <p:sldId id="258" r:id="rId12"/>
     <p:sldId id="266" r:id="rId13"/>
     <p:sldId id="268" r:id="rId14"/>
-    <p:sldId id="269" r:id="rId15"/>
-    <p:sldId id="271" r:id="rId16"/>
+    <p:sldId id="272" r:id="rId15"/>
+    <p:sldId id="269" r:id="rId16"/>
+    <p:sldId id="271" r:id="rId17"/>
   </p:sldIdLst>
   <p:sldSz cx="9144000" cy="6858000" type="screen4x3"/>
   <p:notesSz cx="6858000" cy="9144000"/>
@@ -236,7 +237,7 @@
           <a:p>
             <a:fld id="{473F7A02-9615-F248-8584-8BE3A942EA01}" type="datetimeFigureOut">
               <a:rPr lang="en-US" smtClean="0"/>
-              <a:t>16.05.13</a:t>
+              <a:t>17.05.13</a:t>
             </a:fld>
             <a:endParaRPr lang="en-US"/>
           </a:p>
@@ -849,6 +850,102 @@
     <p:extLst>
       <p:ext uri="{BB962C8B-B14F-4D97-AF65-F5344CB8AC3E}">
         <p14:creationId xmlns:p14="http://schemas.microsoft.com/office/powerpoint/2010/main" val="2934028038"/>
+      </p:ext>
+    </p:extLst>
+  </p:cSld>
+  <p:clrMapOvr>
+    <a:masterClrMapping/>
+  </p:clrMapOvr>
+</p:notes>
+</file>
+
+<file path=ppt/notesSlides/notesSlide3.xml><?xml version="1.0" encoding="utf-8"?>
+<p:notes xmlns:a="http://schemas.openxmlformats.org/drawingml/2006/main" xmlns:r="http://schemas.openxmlformats.org/officeDocument/2006/relationships" xmlns:p="http://schemas.openxmlformats.org/presentationml/2006/main">
+  <p:cSld>
+    <p:spTree>
+      <p:nvGrpSpPr>
+        <p:cNvPr id="1" name=""/>
+        <p:cNvGrpSpPr/>
+        <p:nvPr/>
+      </p:nvGrpSpPr>
+      <p:grpSpPr>
+        <a:xfrm>
+          <a:off x="0" y="0"/>
+          <a:ext cx="0" cy="0"/>
+          <a:chOff x="0" y="0"/>
+          <a:chExt cx="0" cy="0"/>
+        </a:xfrm>
+      </p:grpSpPr>
+      <p:sp>
+        <p:nvSpPr>
+          <p:cNvPr id="2" name="Slide Image Placeholder 1"/>
+          <p:cNvSpPr>
+            <a:spLocks noGrp="1" noRot="1" noChangeAspect="1"/>
+          </p:cNvSpPr>
+          <p:nvPr>
+            <p:ph type="sldImg"/>
+          </p:nvPr>
+        </p:nvSpPr>
+        <p:spPr/>
+      </p:sp>
+      <p:sp>
+        <p:nvSpPr>
+          <p:cNvPr id="3" name="Notes Placeholder 2"/>
+          <p:cNvSpPr>
+            <a:spLocks noGrp="1"/>
+          </p:cNvSpPr>
+          <p:nvPr>
+            <p:ph type="body" idx="1"/>
+          </p:nvPr>
+        </p:nvSpPr>
+        <p:spPr/>
+        <p:txBody>
+          <a:bodyPr/>
+          <a:lstStyle/>
+          <a:p>
+            <a:r>
+              <a:rPr lang="en-US" dirty="0" smtClean="0"/>
+              <a:t>Without violating encapsulation, capture and externalize an object’s internal state so that the object can be returned to this state later.</a:t>
+            </a:r>
+          </a:p>
+          <a:p>
+            <a:r>
+              <a:rPr lang="en-US" dirty="0" smtClean="0"/>
+              <a:t>A magic cookie that encapsulates a “check point” capability.</a:t>
+            </a:r>
+          </a:p>
+          <a:p>
+            <a:endParaRPr lang="en-US" dirty="0" smtClean="0"/>
+          </a:p>
+        </p:txBody>
+      </p:sp>
+      <p:sp>
+        <p:nvSpPr>
+          <p:cNvPr id="4" name="Slide Number Placeholder 3"/>
+          <p:cNvSpPr>
+            <a:spLocks noGrp="1"/>
+          </p:cNvSpPr>
+          <p:nvPr>
+            <p:ph type="sldNum" sz="quarter" idx="10"/>
+          </p:nvPr>
+        </p:nvSpPr>
+        <p:spPr/>
+        <p:txBody>
+          <a:bodyPr/>
+          <a:lstStyle/>
+          <a:p>
+            <a:fld id="{C04B1876-72B1-F048-809B-046DC6EA2E01}" type="slidenum">
+              <a:rPr lang="en-US" smtClean="0"/>
+              <a:t>10</a:t>
+            </a:fld>
+            <a:endParaRPr lang="en-US"/>
+          </a:p>
+        </p:txBody>
+      </p:sp>
+    </p:spTree>
+    <p:extLst>
+      <p:ext uri="{BB962C8B-B14F-4D97-AF65-F5344CB8AC3E}">
+        <p14:creationId xmlns:p14="http://schemas.microsoft.com/office/powerpoint/2010/main" val="3583248440"/>
       </p:ext>
     </p:extLst>
   </p:cSld>
@@ -5707,45 +5804,213 @@
           <a:lstStyle/>
           <a:p>
             <a:r>
-              <a:rPr lang="en-US" sz="1800" b="0" dirty="0" smtClean="0"/>
-              <a:t>+ </a:t>
-            </a:r>
-            <a:r>
-              <a:rPr lang="en-US" sz="1800" b="0" dirty="0" err="1" smtClean="0"/>
+              <a:rPr lang="en-US" sz="1800" dirty="0" err="1" smtClean="0"/>
+              <a:t>Vorteile</a:t>
+            </a:r>
+            <a:r>
+              <a:rPr lang="en-US" sz="1800" dirty="0" smtClean="0"/>
+              <a:t>:</a:t>
+            </a:r>
+          </a:p>
+          <a:p>
+            <a:pPr marL="285750" indent="-285750">
+              <a:buFont typeface="Arial"/>
+              <a:buChar char="•"/>
+            </a:pPr>
+            <a:r>
+              <a:rPr lang="en-US" sz="1800" dirty="0" err="1" smtClean="0"/>
               <a:t>Kapselung</a:t>
             </a:r>
             <a:r>
-              <a:rPr lang="en-US" sz="1800" b="0" dirty="0" smtClean="0"/>
-              <a:t> des </a:t>
-            </a:r>
-            <a:r>
-              <a:rPr lang="en-US" sz="1800" b="0" dirty="0" err="1" smtClean="0"/>
+              <a:rPr lang="en-US" sz="1800" dirty="0" smtClean="0"/>
+              <a:t> </a:t>
+            </a:r>
+            <a:r>
+              <a:rPr lang="en-US" sz="1800" dirty="0" smtClean="0"/>
+              <a:t>des </a:t>
+            </a:r>
+            <a:r>
+              <a:rPr lang="en-US" sz="1800" dirty="0" err="1" smtClean="0"/>
               <a:t>Objekts</a:t>
             </a:r>
             <a:r>
-              <a:rPr lang="en-US" sz="1800" b="0" dirty="0" smtClean="0"/>
+              <a:rPr lang="en-US" sz="1800" dirty="0" smtClean="0"/>
               <a:t> </a:t>
             </a:r>
             <a:r>
-              <a:rPr lang="en-US" sz="1800" b="0" dirty="0" err="1" smtClean="0"/>
+              <a:rPr lang="en-US" sz="1800" dirty="0" err="1" smtClean="0"/>
               <a:t>bleibt</a:t>
             </a:r>
             <a:r>
-              <a:rPr lang="en-US" sz="1800" b="0" dirty="0" smtClean="0"/>
+              <a:rPr lang="en-US" sz="1800" dirty="0" smtClean="0"/>
               <a:t> </a:t>
             </a:r>
             <a:r>
-              <a:rPr lang="en-US" sz="1800" b="0" dirty="0" err="1" smtClean="0"/>
+              <a:rPr lang="en-US" sz="1800" dirty="0" err="1" smtClean="0"/>
               <a:t>erhalten</a:t>
             </a:r>
-            <a:endParaRPr lang="en-US" sz="1800" b="0" dirty="0" smtClean="0"/>
-          </a:p>
-          <a:p>
-            <a:r>
-              <a:rPr lang="en-US" sz="1800" b="0" dirty="0" smtClean="0"/>
-              <a:t>+ </a:t>
-            </a:r>
-            <a:endParaRPr lang="en-US" sz="1800" b="0" dirty="0"/>
+            <a:endParaRPr lang="en-US" sz="1800" dirty="0" smtClean="0"/>
+          </a:p>
+          <a:p>
+            <a:pPr marL="285750" indent="-285750">
+              <a:buFont typeface="Arial"/>
+              <a:buChar char="•"/>
+            </a:pPr>
+            <a:r>
+              <a:rPr lang="en-US" sz="1800" dirty="0" err="1" smtClean="0"/>
+              <a:t>Anzahl</a:t>
+            </a:r>
+            <a:r>
+              <a:rPr lang="en-US" sz="1800" dirty="0" smtClean="0"/>
+              <a:t> </a:t>
+            </a:r>
+            <a:r>
+              <a:rPr lang="en-US" sz="1800" dirty="0" err="1" smtClean="0"/>
+              <a:t>gespeicherter</a:t>
+            </a:r>
+            <a:r>
+              <a:rPr lang="en-US" sz="1800" dirty="0" smtClean="0"/>
+              <a:t> </a:t>
+            </a:r>
+            <a:r>
+              <a:rPr lang="en-US" sz="1800" dirty="0" err="1" smtClean="0"/>
+              <a:t>Stati</a:t>
+            </a:r>
+            <a:r>
+              <a:rPr lang="en-US" sz="1800" dirty="0" smtClean="0"/>
+              <a:t> </a:t>
+            </a:r>
+            <a:r>
+              <a:rPr lang="en-US" sz="1800" dirty="0" err="1" smtClean="0"/>
+              <a:t>flexibel</a:t>
+            </a:r>
+            <a:endParaRPr lang="en-US" sz="1800" dirty="0" smtClean="0"/>
+          </a:p>
+          <a:p>
+            <a:endParaRPr lang="en-US" sz="1800" dirty="0" smtClean="0"/>
+          </a:p>
+          <a:p>
+            <a:r>
+              <a:rPr lang="en-US" sz="1800" dirty="0" err="1" smtClean="0"/>
+              <a:t>Nachteile</a:t>
+            </a:r>
+            <a:r>
+              <a:rPr lang="en-US" sz="1800" dirty="0" smtClean="0"/>
+              <a:t>:</a:t>
+            </a:r>
+            <a:endParaRPr lang="en-US" sz="1800" dirty="0" smtClean="0"/>
+          </a:p>
+          <a:p>
+            <a:pPr marL="285750" indent="-285750">
+              <a:buFont typeface="Arial"/>
+              <a:buChar char="•"/>
+            </a:pPr>
+            <a:r>
+              <a:rPr lang="en-US" sz="1800" dirty="0" err="1" smtClean="0"/>
+              <a:t>Nicht</a:t>
+            </a:r>
+            <a:r>
+              <a:rPr lang="en-US" sz="1800" dirty="0" smtClean="0"/>
+              <a:t> </a:t>
+            </a:r>
+            <a:r>
+              <a:rPr lang="en-US" sz="1800" dirty="0" err="1" smtClean="0"/>
+              <a:t>alle</a:t>
+            </a:r>
+            <a:r>
+              <a:rPr lang="en-US" sz="1800" dirty="0" smtClean="0"/>
+              <a:t> </a:t>
+            </a:r>
+            <a:r>
+              <a:rPr lang="en-US" sz="1800" dirty="0" err="1" smtClean="0"/>
+              <a:t>Stati</a:t>
+            </a:r>
+            <a:r>
+              <a:rPr lang="en-US" sz="1800" dirty="0" smtClean="0"/>
+              <a:t> </a:t>
+            </a:r>
+            <a:r>
+              <a:rPr lang="en-US" sz="1800" dirty="0" err="1" smtClean="0"/>
+              <a:t>lassen</a:t>
+            </a:r>
+            <a:r>
+              <a:rPr lang="en-US" sz="1800" dirty="0" smtClean="0"/>
+              <a:t> </a:t>
+            </a:r>
+            <a:r>
+              <a:rPr lang="en-US" sz="1800" dirty="0" err="1" smtClean="0"/>
+              <a:t>sich</a:t>
+            </a:r>
+            <a:r>
+              <a:rPr lang="en-US" sz="1800" dirty="0" smtClean="0"/>
+              <a:t> </a:t>
+            </a:r>
+            <a:r>
+              <a:rPr lang="en-US" sz="1800" dirty="0" err="1" smtClean="0"/>
+              <a:t>speichern</a:t>
+            </a:r>
+            <a:endParaRPr lang="en-US" sz="1800" dirty="0" smtClean="0"/>
+          </a:p>
+          <a:p>
+            <a:pPr marL="285750" indent="-285750">
+              <a:buFont typeface="Arial"/>
+              <a:buChar char="•"/>
+            </a:pPr>
+            <a:r>
+              <a:rPr lang="en-US" sz="1800" dirty="0" smtClean="0"/>
+              <a:t>Overhead, Memento </a:t>
+            </a:r>
+            <a:r>
+              <a:rPr lang="en-US" sz="1800" dirty="0" err="1" smtClean="0"/>
+              <a:t>ist</a:t>
+            </a:r>
+            <a:r>
+              <a:rPr lang="en-US" sz="1800" dirty="0" smtClean="0"/>
+              <a:t> </a:t>
+            </a:r>
+            <a:r>
+              <a:rPr lang="en-US" sz="1800" dirty="0" err="1" smtClean="0"/>
+              <a:t>aufwändig</a:t>
+            </a:r>
+            <a:r>
+              <a:rPr lang="en-US" sz="1800" dirty="0" smtClean="0"/>
+              <a:t> </a:t>
+            </a:r>
+            <a:r>
+              <a:rPr lang="en-US" sz="1800" dirty="0" err="1" smtClean="0"/>
+              <a:t>zum</a:t>
+            </a:r>
+            <a:r>
+              <a:rPr lang="en-US" sz="1800" dirty="0" smtClean="0"/>
+              <a:t> </a:t>
+            </a:r>
+            <a:r>
+              <a:rPr lang="en-US" sz="1800" dirty="0" err="1" smtClean="0"/>
+              <a:t>ein</a:t>
+            </a:r>
+            <a:r>
+              <a:rPr lang="en-US" sz="1800" dirty="0" smtClean="0"/>
+              <a:t>- und </a:t>
+            </a:r>
+            <a:r>
+              <a:rPr lang="en-US" sz="1800" dirty="0" err="1" smtClean="0"/>
+              <a:t>auspacken</a:t>
+            </a:r>
+            <a:endParaRPr lang="en-US" sz="1800" dirty="0" smtClean="0"/>
+          </a:p>
+          <a:p>
+            <a:pPr marL="285750" indent="-285750">
+              <a:buFontTx/>
+              <a:buChar char="-"/>
+            </a:pPr>
+            <a:endParaRPr lang="en-US" sz="1800" dirty="0" smtClean="0"/>
+          </a:p>
+          <a:p>
+            <a:pPr marL="285750" indent="-285750">
+              <a:buFontTx/>
+              <a:buChar char="-"/>
+            </a:pPr>
+            <a:endParaRPr lang="en-US" sz="1800" dirty="0"/>
           </a:p>
         </p:txBody>
       </p:sp>
@@ -5910,7 +6175,7 @@
           </a:bodyPr>
           <a:lstStyle/>
           <a:p>
-            <a:endParaRPr lang="en-US" sz="1800" b="0" dirty="0" smtClean="0"/>
+            <a:endParaRPr lang="en-US" sz="1800" dirty="0" smtClean="0"/>
           </a:p>
           <a:p>
             <a:pPr marL="285750" indent="-285750">
@@ -5918,7 +6183,7 @@
               <a:buChar char="•"/>
             </a:pPr>
             <a:r>
-              <a:rPr lang="en-US" sz="1800" b="0" dirty="0" smtClean="0"/>
+              <a:rPr lang="en-US" sz="1800" dirty="0" smtClean="0"/>
               <a:t>Caretaker: Editor</a:t>
             </a:r>
           </a:p>
@@ -5927,7 +6192,7 @@
               <a:buFont typeface="Arial"/>
               <a:buChar char="•"/>
             </a:pPr>
-            <a:endParaRPr lang="en-US" sz="1800" b="0" dirty="0" smtClean="0"/>
+            <a:endParaRPr lang="en-US" sz="1800" dirty="0" smtClean="0"/>
           </a:p>
           <a:p>
             <a:pPr marL="285750" indent="-285750">
@@ -5935,23 +6200,23 @@
               <a:buChar char="•"/>
             </a:pPr>
             <a:r>
-              <a:rPr lang="en-US" sz="1800" b="0" dirty="0" smtClean="0"/>
+              <a:rPr lang="en-US" sz="1800" dirty="0" smtClean="0"/>
               <a:t>Originator: Textbox (</a:t>
             </a:r>
             <a:r>
-              <a:rPr lang="en-US" sz="1800" b="0" dirty="0" err="1" smtClean="0"/>
+              <a:rPr lang="en-US" sz="1800" dirty="0" err="1" smtClean="0"/>
               <a:t>mit</a:t>
             </a:r>
             <a:r>
-              <a:rPr lang="en-US" sz="1800" b="0" dirty="0" smtClean="0"/>
+              <a:rPr lang="en-US" sz="1800" dirty="0" smtClean="0"/>
               <a:t> </a:t>
             </a:r>
             <a:r>
-              <a:rPr lang="en-US" sz="1800" b="0" dirty="0" err="1" smtClean="0"/>
+              <a:rPr lang="en-US" sz="1800" dirty="0" err="1" smtClean="0"/>
               <a:t>internem</a:t>
             </a:r>
             <a:r>
-              <a:rPr lang="en-US" sz="1800" b="0" dirty="0" smtClean="0"/>
+              <a:rPr lang="en-US" sz="1800" dirty="0" smtClean="0"/>
               <a:t> Status “Text”)</a:t>
             </a:r>
           </a:p>
@@ -5960,7 +6225,7 @@
               <a:buFont typeface="Arial"/>
               <a:buChar char="•"/>
             </a:pPr>
-            <a:endParaRPr lang="en-US" sz="1800" b="0" dirty="0"/>
+            <a:endParaRPr lang="en-US" sz="1800" dirty="0"/>
           </a:p>
           <a:p>
             <a:pPr marL="285750" indent="-285750">
@@ -5968,30 +6233,30 @@
               <a:buChar char="•"/>
             </a:pPr>
             <a:r>
-              <a:rPr lang="en-US" sz="1800" b="0" dirty="0" smtClean="0"/>
+              <a:rPr lang="en-US" sz="1800" dirty="0" smtClean="0"/>
               <a:t>Memento </a:t>
             </a:r>
             <a:r>
-              <a:rPr lang="en-US" sz="1800" b="0" dirty="0" err="1" smtClean="0"/>
+              <a:rPr lang="en-US" sz="1800" dirty="0" err="1" smtClean="0"/>
               <a:t>implementiert</a:t>
             </a:r>
             <a:r>
-              <a:rPr lang="en-US" sz="1800" b="0" dirty="0" smtClean="0"/>
+              <a:rPr lang="en-US" sz="1800" dirty="0" smtClean="0"/>
               <a:t> </a:t>
             </a:r>
             <a:r>
-              <a:rPr lang="en-US" sz="1800" b="0" dirty="0" err="1" smtClean="0"/>
+              <a:rPr lang="en-US" sz="1800" dirty="0" err="1" smtClean="0"/>
               <a:t>als</a:t>
             </a:r>
             <a:r>
-              <a:rPr lang="en-US" sz="1800" b="0" dirty="0" smtClean="0"/>
+              <a:rPr lang="en-US" sz="1800" dirty="0" smtClean="0"/>
               <a:t> interne </a:t>
             </a:r>
             <a:r>
-              <a:rPr lang="en-US" sz="1800" b="0" dirty="0" err="1" smtClean="0"/>
+              <a:rPr lang="en-US" sz="1800" dirty="0" err="1" smtClean="0"/>
               <a:t>Klasse</a:t>
             </a:r>
-            <a:endParaRPr lang="en-US" sz="1800" b="0" dirty="0" smtClean="0"/>
+            <a:endParaRPr lang="en-US" sz="1800" dirty="0" smtClean="0"/>
           </a:p>
         </p:txBody>
       </p:sp>
@@ -6177,6 +6442,348 @@
           <a:p>
             <a:r>
               <a:rPr lang="en-US" dirty="0" smtClean="0"/>
+              <a:t>Memento: Checklist</a:t>
+            </a:r>
+            <a:endParaRPr lang="en-US" dirty="0"/>
+          </a:p>
+        </p:txBody>
+      </p:sp>
+      <p:sp>
+        <p:nvSpPr>
+          <p:cNvPr id="3" name="Text Placeholder 2"/>
+          <p:cNvSpPr>
+            <a:spLocks noGrp="1"/>
+          </p:cNvSpPr>
+          <p:nvPr>
+            <p:ph type="body" sz="quarter" idx="13"/>
+          </p:nvPr>
+        </p:nvSpPr>
+        <p:spPr/>
+        <p:txBody>
+          <a:bodyPr/>
+          <a:lstStyle/>
+          <a:p>
+            <a:pPr marL="342900" indent="-342900">
+              <a:buFont typeface="+mj-lt"/>
+              <a:buAutoNum type="arabicPeriod"/>
+            </a:pPr>
+            <a:r>
+              <a:rPr lang="en-US" dirty="0" err="1" smtClean="0"/>
+              <a:t>Rollen</a:t>
+            </a:r>
+            <a:r>
+              <a:rPr lang="en-US" dirty="0" smtClean="0"/>
+              <a:t> von “Caretaker” und “Originator” </a:t>
+            </a:r>
+            <a:r>
+              <a:rPr lang="en-US" dirty="0" err="1" smtClean="0"/>
+              <a:t>definieren</a:t>
+            </a:r>
+            <a:endParaRPr lang="en-US" dirty="0" smtClean="0"/>
+          </a:p>
+          <a:p>
+            <a:pPr marL="342900" indent="-342900">
+              <a:buFont typeface="+mj-lt"/>
+              <a:buAutoNum type="arabicPeriod"/>
+            </a:pPr>
+            <a:r>
+              <a:rPr lang="en-US" dirty="0" smtClean="0"/>
+              <a:t>Memento-</a:t>
+            </a:r>
+            <a:r>
+              <a:rPr lang="en-US" dirty="0" err="1" smtClean="0"/>
+              <a:t>Klasse</a:t>
+            </a:r>
+            <a:r>
+              <a:rPr lang="en-US" dirty="0" smtClean="0"/>
+              <a:t> (</a:t>
+            </a:r>
+            <a:r>
+              <a:rPr lang="en-US" dirty="0" err="1" smtClean="0"/>
+              <a:t>als</a:t>
+            </a:r>
+            <a:r>
+              <a:rPr lang="en-US" dirty="0" smtClean="0"/>
+              <a:t> interne </a:t>
+            </a:r>
+            <a:r>
+              <a:rPr lang="en-US" dirty="0" err="1" smtClean="0"/>
+              <a:t>Klasse</a:t>
+            </a:r>
+            <a:r>
+              <a:rPr lang="en-US" dirty="0" smtClean="0"/>
+              <a:t>) </a:t>
+            </a:r>
+            <a:r>
+              <a:rPr lang="en-US" dirty="0" err="1" smtClean="0"/>
+              <a:t>definieren</a:t>
+            </a:r>
+            <a:endParaRPr lang="en-US" dirty="0" smtClean="0"/>
+          </a:p>
+          <a:p>
+            <a:pPr marL="342900" indent="-342900">
+              <a:buFont typeface="+mj-lt"/>
+              <a:buAutoNum type="arabicPeriod"/>
+            </a:pPr>
+            <a:endParaRPr lang="en-US" dirty="0" smtClean="0"/>
+          </a:p>
+          <a:p>
+            <a:pPr marL="342900" indent="-342900">
+              <a:buFont typeface="+mj-lt"/>
+              <a:buAutoNum type="arabicPeriod"/>
+            </a:pPr>
+            <a:r>
+              <a:rPr lang="en-US" dirty="0" smtClean="0"/>
+              <a:t>Caretaker </a:t>
+            </a:r>
+            <a:r>
+              <a:rPr lang="en-US" dirty="0" err="1" smtClean="0"/>
+              <a:t>entscheidet</a:t>
+            </a:r>
+            <a:r>
+              <a:rPr lang="en-US" dirty="0" smtClean="0"/>
+              <a:t>, </a:t>
+            </a:r>
+            <a:r>
+              <a:rPr lang="en-US" dirty="0" err="1" smtClean="0"/>
+              <a:t>wann</a:t>
+            </a:r>
+            <a:r>
+              <a:rPr lang="en-US" dirty="0" smtClean="0"/>
+              <a:t> </a:t>
+            </a:r>
+            <a:r>
+              <a:rPr lang="en-US" dirty="0" err="1" smtClean="0"/>
+              <a:t>eine</a:t>
+            </a:r>
+            <a:r>
+              <a:rPr lang="en-US" dirty="0" smtClean="0"/>
+              <a:t> </a:t>
+            </a:r>
+            <a:r>
+              <a:rPr lang="en-US" dirty="0" err="1" smtClean="0"/>
+              <a:t>Speicherung</a:t>
+            </a:r>
+            <a:r>
+              <a:rPr lang="en-US" dirty="0" smtClean="0"/>
+              <a:t> </a:t>
+            </a:r>
+            <a:r>
+              <a:rPr lang="en-US" dirty="0" err="1" smtClean="0"/>
+              <a:t>stattfindet</a:t>
+            </a:r>
+            <a:endParaRPr lang="en-US" dirty="0" smtClean="0"/>
+          </a:p>
+          <a:p>
+            <a:pPr marL="342900" indent="-342900">
+              <a:buFont typeface="+mj-lt"/>
+              <a:buAutoNum type="arabicPeriod"/>
+            </a:pPr>
+            <a:r>
+              <a:rPr lang="en-US" dirty="0" smtClean="0"/>
+              <a:t>Der Originator </a:t>
+            </a:r>
+            <a:r>
+              <a:rPr lang="en-US" dirty="0" err="1" smtClean="0"/>
+              <a:t>erstellt</a:t>
+            </a:r>
+            <a:r>
+              <a:rPr lang="en-US" dirty="0" smtClean="0"/>
+              <a:t> </a:t>
+            </a:r>
+            <a:r>
+              <a:rPr lang="en-US" dirty="0" err="1" smtClean="0"/>
+              <a:t>ein</a:t>
+            </a:r>
+            <a:r>
+              <a:rPr lang="en-US" dirty="0" smtClean="0"/>
+              <a:t> Memento und </a:t>
+            </a:r>
+            <a:r>
+              <a:rPr lang="en-US" dirty="0" err="1" smtClean="0"/>
+              <a:t>kopiert</a:t>
+            </a:r>
+            <a:r>
+              <a:rPr lang="en-US" dirty="0" smtClean="0"/>
+              <a:t> </a:t>
+            </a:r>
+            <a:r>
+              <a:rPr lang="en-US" dirty="0" err="1" smtClean="0"/>
+              <a:t>seinen</a:t>
+            </a:r>
+            <a:r>
+              <a:rPr lang="en-US" dirty="0" smtClean="0"/>
+              <a:t> Status in dieses</a:t>
+            </a:r>
+          </a:p>
+          <a:p>
+            <a:pPr marL="342900" indent="-342900">
+              <a:buFont typeface="+mj-lt"/>
+              <a:buAutoNum type="arabicPeriod"/>
+            </a:pPr>
+            <a:r>
+              <a:rPr lang="en-US" dirty="0" smtClean="0"/>
+              <a:t>Caretaker </a:t>
+            </a:r>
+            <a:r>
+              <a:rPr lang="en-US" dirty="0" err="1" smtClean="0"/>
+              <a:t>übernimmt</a:t>
+            </a:r>
+            <a:r>
+              <a:rPr lang="en-US" dirty="0" smtClean="0"/>
+              <a:t> das Memento</a:t>
+            </a:r>
+          </a:p>
+          <a:p>
+            <a:pPr marL="342900" indent="-342900">
+              <a:buFont typeface="+mj-lt"/>
+              <a:buAutoNum type="arabicPeriod"/>
+            </a:pPr>
+            <a:endParaRPr lang="en-US" dirty="0" smtClean="0"/>
+          </a:p>
+          <a:p>
+            <a:pPr marL="342900" indent="-342900">
+              <a:buFont typeface="+mj-lt"/>
+              <a:buAutoNum type="arabicPeriod"/>
+            </a:pPr>
+            <a:r>
+              <a:rPr lang="en-US" dirty="0" smtClean="0"/>
+              <a:t>Caretaker </a:t>
+            </a:r>
+            <a:r>
+              <a:rPr lang="en-US" dirty="0" err="1" smtClean="0"/>
+              <a:t>weiss</a:t>
+            </a:r>
+            <a:r>
+              <a:rPr lang="en-US" dirty="0" smtClean="0"/>
+              <a:t>, </a:t>
+            </a:r>
+            <a:r>
+              <a:rPr lang="en-US" dirty="0" err="1" smtClean="0"/>
+              <a:t>wann</a:t>
+            </a:r>
+            <a:r>
+              <a:rPr lang="en-US" dirty="0" smtClean="0"/>
+              <a:t> </a:t>
+            </a:r>
+            <a:r>
+              <a:rPr lang="en-US" dirty="0" err="1" smtClean="0"/>
+              <a:t>ein</a:t>
+            </a:r>
+            <a:r>
+              <a:rPr lang="en-US" dirty="0" smtClean="0"/>
+              <a:t> “Undo” </a:t>
+            </a:r>
+            <a:r>
+              <a:rPr lang="en-US" dirty="0" err="1" smtClean="0"/>
+              <a:t>ausgeführt</a:t>
+            </a:r>
+            <a:r>
+              <a:rPr lang="en-US" dirty="0" smtClean="0"/>
+              <a:t> </a:t>
+            </a:r>
+            <a:r>
+              <a:rPr lang="en-US" dirty="0" err="1" smtClean="0"/>
+              <a:t>werden</a:t>
+            </a:r>
+            <a:r>
+              <a:rPr lang="en-US" dirty="0" smtClean="0"/>
+              <a:t> </a:t>
+            </a:r>
+            <a:r>
+              <a:rPr lang="en-US" dirty="0" err="1" smtClean="0"/>
+              <a:t>soll</a:t>
+            </a:r>
+            <a:endParaRPr lang="en-US" dirty="0" smtClean="0"/>
+          </a:p>
+          <a:p>
+            <a:pPr marL="342900" indent="-342900">
+              <a:buFont typeface="+mj-lt"/>
+              <a:buAutoNum type="arabicPeriod"/>
+            </a:pPr>
+            <a:r>
+              <a:rPr lang="en-US" dirty="0" smtClean="0"/>
+              <a:t>Originator </a:t>
+            </a:r>
+            <a:r>
+              <a:rPr lang="en-US" dirty="0" err="1" smtClean="0"/>
+              <a:t>setzt</a:t>
+            </a:r>
+            <a:r>
+              <a:rPr lang="en-US" dirty="0" smtClean="0"/>
+              <a:t> </a:t>
+            </a:r>
+            <a:r>
+              <a:rPr lang="en-US" dirty="0" err="1" smtClean="0"/>
+              <a:t>sich</a:t>
+            </a:r>
+            <a:r>
+              <a:rPr lang="en-US" dirty="0" smtClean="0"/>
+              <a:t> </a:t>
+            </a:r>
+            <a:r>
+              <a:rPr lang="en-US" dirty="0" err="1" smtClean="0"/>
+              <a:t>selbst</a:t>
+            </a:r>
+            <a:r>
+              <a:rPr lang="en-US" dirty="0" smtClean="0"/>
+              <a:t> </a:t>
+            </a:r>
+            <a:r>
+              <a:rPr lang="en-US" dirty="0" err="1" smtClean="0"/>
+              <a:t>zurück</a:t>
+            </a:r>
+            <a:endParaRPr lang="en-US" dirty="0"/>
+          </a:p>
+        </p:txBody>
+      </p:sp>
+    </p:spTree>
+    <p:extLst>
+      <p:ext uri="{BB962C8B-B14F-4D97-AF65-F5344CB8AC3E}">
+        <p14:creationId xmlns:p14="http://schemas.microsoft.com/office/powerpoint/2010/main" val="3515839067"/>
+      </p:ext>
+    </p:extLst>
+  </p:cSld>
+  <p:clrMapOvr>
+    <a:masterClrMapping/>
+  </p:clrMapOvr>
+</p:sld>
+</file>
+
+<file path=ppt/slides/slide15.xml><?xml version="1.0" encoding="utf-8"?>
+<p:sld xmlns:a="http://schemas.openxmlformats.org/drawingml/2006/main" xmlns:r="http://schemas.openxmlformats.org/officeDocument/2006/relationships" xmlns:p="http://schemas.openxmlformats.org/presentationml/2006/main">
+  <p:cSld>
+    <p:spTree>
+      <p:nvGrpSpPr>
+        <p:cNvPr id="1" name=""/>
+        <p:cNvGrpSpPr/>
+        <p:nvPr/>
+      </p:nvGrpSpPr>
+      <p:grpSpPr>
+        <a:xfrm>
+          <a:off x="0" y="0"/>
+          <a:ext cx="0" cy="0"/>
+          <a:chOff x="0" y="0"/>
+          <a:chExt cx="0" cy="0"/>
+        </a:xfrm>
+      </p:grpSpPr>
+      <p:sp>
+        <p:nvSpPr>
+          <p:cNvPr id="2" name="Title 1"/>
+          <p:cNvSpPr>
+            <a:spLocks noGrp="1"/>
+          </p:cNvSpPr>
+          <p:nvPr>
+            <p:ph type="title"/>
+          </p:nvPr>
+        </p:nvSpPr>
+        <p:spPr/>
+        <p:txBody>
+          <a:bodyPr/>
+          <a:lstStyle/>
+          <a:p>
+            <a:r>
+              <a:rPr lang="en-US" dirty="0" smtClean="0"/>
               <a:t>Memento: Things to consider</a:t>
             </a:r>
             <a:endParaRPr lang="en-US" dirty="0"/>
@@ -6204,7 +6811,7 @@
               <a:buFont typeface="Arial"/>
               <a:buChar char="•"/>
             </a:pPr>
-            <a:endParaRPr lang="en-US" sz="1800" b="0" dirty="0" smtClean="0"/>
+            <a:endParaRPr lang="en-US" sz="1800" dirty="0" smtClean="0"/>
           </a:p>
           <a:p>
             <a:pPr marL="285750" indent="-285750">
@@ -6212,23 +6819,23 @@
               <a:buChar char="•"/>
             </a:pPr>
             <a:r>
-              <a:rPr lang="en-US" sz="1800" b="0" dirty="0" err="1" smtClean="0"/>
+              <a:rPr lang="en-US" sz="1800" dirty="0" err="1" smtClean="0"/>
               <a:t>Interner</a:t>
             </a:r>
             <a:r>
-              <a:rPr lang="en-US" sz="1800" b="0" dirty="0" smtClean="0"/>
+              <a:rPr lang="en-US" sz="1800" dirty="0" smtClean="0"/>
               <a:t> Status = </a:t>
             </a:r>
             <a:r>
-              <a:rPr lang="en-US" sz="1800" b="0" dirty="0" err="1" smtClean="0"/>
+              <a:rPr lang="en-US" sz="1800" dirty="0" err="1" smtClean="0"/>
               <a:t>Objekt</a:t>
             </a:r>
             <a:r>
-              <a:rPr lang="en-US" sz="1800" b="0" dirty="0" smtClean="0"/>
+              <a:rPr lang="en-US" sz="1800" dirty="0" smtClean="0"/>
               <a:t> </a:t>
             </a:r>
             <a:r>
-              <a:rPr lang="en-US" sz="1800" b="0" dirty="0" smtClean="0">
+              <a:rPr lang="en-US" sz="1800" dirty="0" smtClean="0">
                 <a:sym typeface="Wingdings"/>
               </a:rPr>
               <a:t> Clone!</a:t>
@@ -6239,7 +6846,7 @@
               <a:buFont typeface="Arial"/>
               <a:buChar char="•"/>
             </a:pPr>
-            <a:endParaRPr lang="en-US" sz="1800" b="0" dirty="0">
+            <a:endParaRPr lang="en-US" sz="1800" dirty="0">
               <a:sym typeface="Wingdings"/>
             </a:endParaRPr>
           </a:p>
@@ -6248,7 +6855,67 @@
               <a:buFont typeface="Arial"/>
               <a:buChar char="•"/>
             </a:pPr>
-            <a:endParaRPr lang="en-US" sz="1800" b="0" dirty="0" smtClean="0">
+            <a:r>
+              <a:rPr lang="en-US" sz="1800" dirty="0" smtClean="0">
+                <a:sym typeface="Wingdings"/>
+              </a:rPr>
+              <a:t>Handling von </a:t>
+            </a:r>
+            <a:r>
+              <a:rPr lang="en-US" sz="1800" dirty="0" err="1" smtClean="0">
+                <a:sym typeface="Wingdings"/>
+              </a:rPr>
+              <a:t>gesicherten</a:t>
+            </a:r>
+            <a:r>
+              <a:rPr lang="en-US" sz="1800" dirty="0" smtClean="0">
+                <a:sym typeface="Wingdings"/>
+              </a:rPr>
+              <a:t> </a:t>
+            </a:r>
+            <a:r>
+              <a:rPr lang="en-US" sz="1800" dirty="0" err="1" smtClean="0">
+                <a:sym typeface="Wingdings"/>
+              </a:rPr>
+              <a:t>Stati</a:t>
+            </a:r>
+            <a:r>
+              <a:rPr lang="en-US" sz="1800" dirty="0" smtClean="0">
+                <a:sym typeface="Wingdings"/>
+              </a:rPr>
+              <a:t> </a:t>
+            </a:r>
+            <a:r>
+              <a:rPr lang="en-US" sz="1800" dirty="0" err="1" smtClean="0">
+                <a:sym typeface="Wingdings"/>
+              </a:rPr>
+              <a:t>kann</a:t>
+            </a:r>
+            <a:r>
+              <a:rPr lang="en-US" sz="1800" dirty="0" smtClean="0">
+                <a:sym typeface="Wingdings"/>
+              </a:rPr>
+              <a:t> </a:t>
+            </a:r>
+            <a:r>
+              <a:rPr lang="en-US" sz="1800" dirty="0" err="1" smtClean="0">
+                <a:sym typeface="Wingdings"/>
+              </a:rPr>
+              <a:t>aufwändig</a:t>
+            </a:r>
+            <a:r>
+              <a:rPr lang="en-US" sz="1800" dirty="0" smtClean="0">
+                <a:sym typeface="Wingdings"/>
+              </a:rPr>
+              <a:t> </a:t>
+            </a:r>
+            <a:r>
+              <a:rPr lang="en-US" sz="1800" dirty="0" err="1" smtClean="0">
+                <a:sym typeface="Wingdings"/>
+              </a:rPr>
+              <a:t>sein</a:t>
+            </a:r>
+            <a:endParaRPr lang="en-US" sz="1800" dirty="0" smtClean="0">
               <a:sym typeface="Wingdings"/>
             </a:endParaRPr>
           </a:p>
@@ -6257,7 +6924,7 @@
               <a:buFont typeface="Arial"/>
               <a:buChar char="•"/>
             </a:pPr>
-            <a:endParaRPr lang="en-US" sz="1800" b="0" dirty="0">
+            <a:endParaRPr lang="en-US" sz="1800" dirty="0">
               <a:sym typeface="Wingdings"/>
             </a:endParaRPr>
           </a:p>
@@ -6266,7 +6933,25 @@
               <a:buFont typeface="Arial"/>
               <a:buChar char="•"/>
             </a:pPr>
-            <a:endParaRPr lang="en-US" sz="1800" b="0" dirty="0"/>
+            <a:endParaRPr lang="en-US" sz="1800" dirty="0" smtClean="0">
+              <a:sym typeface="Wingdings"/>
+            </a:endParaRPr>
+          </a:p>
+          <a:p>
+            <a:pPr marL="285750" indent="-285750">
+              <a:buFont typeface="Arial"/>
+              <a:buChar char="•"/>
+            </a:pPr>
+            <a:endParaRPr lang="en-US" sz="1800" dirty="0">
+              <a:sym typeface="Wingdings"/>
+            </a:endParaRPr>
+          </a:p>
+          <a:p>
+            <a:pPr marL="285750" indent="-285750">
+              <a:buFont typeface="Arial"/>
+              <a:buChar char="•"/>
+            </a:pPr>
+            <a:endParaRPr lang="en-US" sz="1800" dirty="0"/>
           </a:p>
         </p:txBody>
       </p:sp>
@@ -6283,7 +6968,7 @@
 </p:sld>
 </file>
 
-<file path=ppt/slides/slide15.xml><?xml version="1.0" encoding="utf-8"?>
+<file path=ppt/slides/slide16.xml><?xml version="1.0" encoding="utf-8"?>
 <p:sld xmlns:a="http://schemas.openxmlformats.org/drawingml/2006/main" xmlns:r="http://schemas.openxmlformats.org/officeDocument/2006/relationships" xmlns:p="http://schemas.openxmlformats.org/presentationml/2006/main">
   <p:cSld>
     <p:spTree>
@@ -7563,10 +8248,6 @@
               <a:rPr lang="en-US" dirty="0" err="1" smtClean="0"/>
               <a:t>Mechanismen</a:t>
             </a:r>
-            <a:r>
-              <a:rPr lang="en-US" dirty="0" smtClean="0"/>
-              <a:t> (1)</a:t>
-            </a:r>
             <a:endParaRPr lang="en-US" dirty="0"/>
           </a:p>
         </p:txBody>
@@ -7589,15 +8270,15 @@
           <a:lstStyle/>
           <a:p>
             <a:r>
-              <a:rPr lang="en-US" sz="1800" b="0" dirty="0" smtClean="0"/>
+              <a:rPr lang="en-US" sz="1800" dirty="0" smtClean="0"/>
               <a:t>Status </a:t>
             </a:r>
             <a:r>
-              <a:rPr lang="en-US" sz="1800" b="0" dirty="0" err="1" smtClean="0"/>
+              <a:rPr lang="en-US" sz="1800" dirty="0" err="1" smtClean="0"/>
               <a:t>speichern</a:t>
             </a:r>
             <a:r>
-              <a:rPr lang="en-US" sz="1800" b="0" dirty="0" smtClean="0"/>
+              <a:rPr lang="en-US" sz="1800" dirty="0" smtClean="0"/>
               <a:t>:</a:t>
             </a:r>
           </a:p>
@@ -7607,23 +8288,23 @@
               <a:buAutoNum type="arabicPeriod"/>
             </a:pPr>
             <a:r>
-              <a:rPr lang="en-US" sz="1800" b="0" dirty="0" smtClean="0"/>
+              <a:rPr lang="en-US" sz="1800" dirty="0" smtClean="0"/>
               <a:t>Caretaker </a:t>
             </a:r>
             <a:r>
-              <a:rPr lang="en-US" sz="1800" b="0" dirty="0" err="1" smtClean="0"/>
+              <a:rPr lang="en-US" sz="1800" dirty="0" err="1" smtClean="0"/>
               <a:t>ruft</a:t>
             </a:r>
             <a:r>
-              <a:rPr lang="en-US" sz="1800" b="0" dirty="0" smtClean="0"/>
+              <a:rPr lang="en-US" sz="1800" dirty="0" smtClean="0"/>
               <a:t> “</a:t>
             </a:r>
             <a:r>
-              <a:rPr lang="en-US" sz="1800" b="0" dirty="0" err="1" smtClean="0"/>
+              <a:rPr lang="en-US" sz="1800" dirty="0" err="1" smtClean="0"/>
               <a:t>createMemento</a:t>
             </a:r>
             <a:r>
-              <a:rPr lang="en-US" sz="1800" b="0" dirty="0" smtClean="0"/>
+              <a:rPr lang="en-US" sz="1800" dirty="0" smtClean="0"/>
               <a:t>()” des Originators auf</a:t>
             </a:r>
           </a:p>
@@ -7633,39 +8314,39 @@
               <a:buAutoNum type="arabicPeriod"/>
             </a:pPr>
             <a:r>
-              <a:rPr lang="en-US" sz="1800" b="0" dirty="0" smtClean="0"/>
+              <a:rPr lang="en-US" sz="1800" dirty="0" smtClean="0"/>
               <a:t>Originator </a:t>
             </a:r>
             <a:r>
-              <a:rPr lang="en-US" sz="1800" b="0" dirty="0" err="1" smtClean="0"/>
+              <a:rPr lang="en-US" sz="1800" dirty="0" err="1" smtClean="0"/>
               <a:t>erstellt</a:t>
             </a:r>
             <a:r>
-              <a:rPr lang="en-US" sz="1800" b="0" dirty="0" smtClean="0"/>
+              <a:rPr lang="en-US" sz="1800" dirty="0" smtClean="0"/>
               <a:t> </a:t>
             </a:r>
             <a:r>
-              <a:rPr lang="en-US" sz="1800" b="0" dirty="0" err="1" smtClean="0"/>
+              <a:rPr lang="en-US" sz="1800" dirty="0" err="1" smtClean="0"/>
               <a:t>ein</a:t>
             </a:r>
             <a:r>
-              <a:rPr lang="en-US" sz="1800" b="0" dirty="0" smtClean="0"/>
+              <a:rPr lang="en-US" sz="1800" dirty="0" smtClean="0"/>
               <a:t> Memento </a:t>
             </a:r>
             <a:r>
-              <a:rPr lang="en-US" sz="1800" b="0" dirty="0" err="1" smtClean="0"/>
+              <a:rPr lang="en-US" sz="1800" dirty="0" err="1" smtClean="0"/>
               <a:t>mit</a:t>
             </a:r>
             <a:r>
-              <a:rPr lang="en-US" sz="1800" b="0" dirty="0" smtClean="0"/>
+              <a:rPr lang="en-US" sz="1800" dirty="0" smtClean="0"/>
               <a:t> </a:t>
             </a:r>
             <a:r>
-              <a:rPr lang="en-US" sz="1800" b="0" dirty="0" err="1" smtClean="0"/>
+              <a:rPr lang="en-US" sz="1800" dirty="0" err="1" smtClean="0"/>
               <a:t>seinem</a:t>
             </a:r>
             <a:r>
-              <a:rPr lang="en-US" sz="1800" b="0" dirty="0" smtClean="0"/>
+              <a:rPr lang="en-US" sz="1800" dirty="0" smtClean="0"/>
               <a:t> Status</a:t>
             </a:r>
           </a:p>
@@ -7675,41 +8356,41 @@
               <a:buAutoNum type="arabicPeriod"/>
             </a:pPr>
             <a:r>
-              <a:rPr lang="en-US" sz="1800" b="0" dirty="0" smtClean="0"/>
+              <a:rPr lang="en-US" sz="1800" dirty="0" smtClean="0"/>
               <a:t>Originator </a:t>
             </a:r>
             <a:r>
-              <a:rPr lang="en-US" sz="1800" b="0" dirty="0" err="1" smtClean="0"/>
+              <a:rPr lang="en-US" sz="1800" dirty="0" err="1" smtClean="0"/>
               <a:t>gibt</a:t>
             </a:r>
             <a:r>
-              <a:rPr lang="en-US" sz="1800" b="0" dirty="0" smtClean="0"/>
+              <a:rPr lang="en-US" sz="1800" dirty="0" smtClean="0"/>
               <a:t> dieses Memento an den Caretaker </a:t>
             </a:r>
             <a:r>
-              <a:rPr lang="en-US" sz="1800" b="0" dirty="0" err="1" smtClean="0"/>
+              <a:rPr lang="en-US" sz="1800" dirty="0" err="1" smtClean="0"/>
               <a:t>zurück</a:t>
             </a:r>
-            <a:endParaRPr lang="en-US" sz="1800" b="0" dirty="0" smtClean="0"/>
+            <a:endParaRPr lang="en-US" sz="1800" dirty="0" smtClean="0"/>
           </a:p>
           <a:p>
             <a:pPr marL="342900" indent="-342900">
               <a:buFont typeface="+mj-lt"/>
               <a:buAutoNum type="arabicPeriod"/>
             </a:pPr>
-            <a:endParaRPr lang="en-US" sz="1800" b="0" dirty="0"/>
-          </a:p>
-          <a:p>
-            <a:r>
-              <a:rPr lang="en-US" sz="1800" b="0" dirty="0" smtClean="0"/>
+            <a:endParaRPr lang="en-US" sz="1800" dirty="0"/>
+          </a:p>
+          <a:p>
+            <a:r>
+              <a:rPr lang="en-US" sz="1800" dirty="0" smtClean="0"/>
               <a:t>Status </a:t>
             </a:r>
             <a:r>
-              <a:rPr lang="en-US" sz="1800" b="0" dirty="0" err="1" smtClean="0"/>
+              <a:rPr lang="en-US" sz="1800" dirty="0" err="1" smtClean="0"/>
               <a:t>zurücksetzen</a:t>
             </a:r>
             <a:r>
-              <a:rPr lang="en-US" sz="1800" b="0" dirty="0" smtClean="0"/>
+              <a:rPr lang="en-US" sz="1800" dirty="0" smtClean="0"/>
               <a:t> (Undo):</a:t>
             </a:r>
           </a:p>
@@ -7719,23 +8400,23 @@
               <a:buAutoNum type="arabicPeriod"/>
             </a:pPr>
             <a:r>
-              <a:rPr lang="en-US" sz="1800" b="0" dirty="0" smtClean="0"/>
+              <a:rPr lang="en-US" sz="1800" dirty="0" smtClean="0"/>
               <a:t>Caretaker </a:t>
             </a:r>
             <a:r>
-              <a:rPr lang="en-US" sz="1800" b="0" dirty="0" err="1" smtClean="0"/>
+              <a:rPr lang="en-US" sz="1800" dirty="0" err="1" smtClean="0"/>
               <a:t>ruft</a:t>
             </a:r>
             <a:r>
-              <a:rPr lang="en-US" sz="1800" b="0" dirty="0" smtClean="0"/>
+              <a:rPr lang="en-US" sz="1800" dirty="0" smtClean="0"/>
               <a:t> “</a:t>
             </a:r>
             <a:r>
-              <a:rPr lang="en-US" sz="1800" b="0" dirty="0" err="1" smtClean="0"/>
+              <a:rPr lang="en-US" sz="1800" dirty="0" err="1" smtClean="0"/>
               <a:t>setMemento</a:t>
             </a:r>
             <a:r>
-              <a:rPr lang="en-US" sz="1800" b="0" dirty="0" smtClean="0"/>
+              <a:rPr lang="en-US" sz="1800" dirty="0" smtClean="0"/>
               <a:t>(Memento m)” des Originators auf</a:t>
             </a:r>
           </a:p>
@@ -7745,39 +8426,39 @@
               <a:buAutoNum type="arabicPeriod"/>
             </a:pPr>
             <a:r>
-              <a:rPr lang="en-US" sz="1800" b="0" dirty="0" smtClean="0"/>
+              <a:rPr lang="en-US" sz="1800" dirty="0" smtClean="0"/>
               <a:t>Originator </a:t>
             </a:r>
             <a:r>
-              <a:rPr lang="en-US" sz="1800" b="0" dirty="0" err="1" smtClean="0"/>
+              <a:rPr lang="en-US" sz="1800" dirty="0" err="1" smtClean="0"/>
               <a:t>setzt</a:t>
             </a:r>
             <a:r>
-              <a:rPr lang="en-US" sz="1800" b="0" dirty="0" smtClean="0"/>
+              <a:rPr lang="en-US" sz="1800" dirty="0" smtClean="0"/>
               <a:t> </a:t>
             </a:r>
             <a:r>
-              <a:rPr lang="en-US" sz="1800" b="0" dirty="0" err="1" smtClean="0"/>
+              <a:rPr lang="en-US" sz="1800" dirty="0" err="1" smtClean="0"/>
               <a:t>seinen</a:t>
             </a:r>
             <a:r>
-              <a:rPr lang="en-US" sz="1800" b="0" dirty="0" smtClean="0"/>
+              <a:rPr lang="en-US" sz="1800" dirty="0" smtClean="0"/>
               <a:t> </a:t>
             </a:r>
             <a:r>
-              <a:rPr lang="en-US" sz="1800" b="0" dirty="0" err="1" smtClean="0"/>
+              <a:rPr lang="en-US" sz="1800" dirty="0" err="1" smtClean="0"/>
               <a:t>internen</a:t>
             </a:r>
             <a:r>
-              <a:rPr lang="en-US" sz="1800" b="0" dirty="0" smtClean="0"/>
+              <a:rPr lang="en-US" sz="1800" dirty="0" smtClean="0"/>
               <a:t> Status auf den Status </a:t>
             </a:r>
             <a:r>
-              <a:rPr lang="en-US" sz="1800" b="0" dirty="0" err="1" smtClean="0"/>
+              <a:rPr lang="en-US" sz="1800" dirty="0" err="1" smtClean="0"/>
               <a:t>im</a:t>
             </a:r>
             <a:r>
-              <a:rPr lang="en-US" sz="1800" b="0" dirty="0" smtClean="0"/>
+              <a:rPr lang="en-US" sz="1800" dirty="0" smtClean="0"/>
               <a:t> Memento</a:t>
             </a:r>
           </a:p>
@@ -7865,15 +8546,15 @@
           <a:lstStyle/>
           <a:p>
             <a:r>
-              <a:rPr lang="en-US" sz="1800" b="0" dirty="0" smtClean="0"/>
+              <a:rPr lang="en-US" sz="1800" dirty="0" smtClean="0"/>
               <a:t>Caretaker hat </a:t>
             </a:r>
             <a:r>
-              <a:rPr lang="en-US" sz="1800" b="0" dirty="0" err="1" smtClean="0"/>
+              <a:rPr lang="en-US" sz="1800" dirty="0" err="1" smtClean="0"/>
               <a:t>eingeschränktes</a:t>
             </a:r>
             <a:r>
-              <a:rPr lang="en-US" sz="1800" b="0" dirty="0" smtClean="0"/>
+              <a:rPr lang="en-US" sz="1800" dirty="0" smtClean="0"/>
               <a:t> Interface:</a:t>
             </a:r>
           </a:p>
@@ -7883,19 +8564,19 @@
               <a:buChar char="•"/>
             </a:pPr>
             <a:r>
-              <a:rPr lang="en-US" sz="1800" b="0" dirty="0" err="1" smtClean="0"/>
+              <a:rPr lang="en-US" sz="1800" dirty="0" err="1" smtClean="0"/>
               <a:t>Kein</a:t>
             </a:r>
             <a:r>
-              <a:rPr lang="en-US" sz="1800" b="0" dirty="0" smtClean="0"/>
+              <a:rPr lang="en-US" sz="1800" dirty="0" smtClean="0"/>
               <a:t> </a:t>
             </a:r>
             <a:r>
-              <a:rPr lang="en-US" sz="1800" b="0" dirty="0" err="1" smtClean="0"/>
+              <a:rPr lang="en-US" sz="1800" dirty="0" err="1" smtClean="0"/>
               <a:t>Zugriff</a:t>
             </a:r>
             <a:r>
-              <a:rPr lang="en-US" sz="1800" b="0" dirty="0" smtClean="0"/>
+              <a:rPr lang="en-US" sz="1800" dirty="0" smtClean="0"/>
               <a:t> auf das Memento</a:t>
             </a:r>
           </a:p>
@@ -7905,34 +8586,34 @@
               <a:buChar char="•"/>
             </a:pPr>
             <a:r>
-              <a:rPr lang="en-US" sz="1800" b="0" dirty="0" err="1" smtClean="0"/>
+              <a:rPr lang="en-US" sz="1800" dirty="0" err="1" smtClean="0"/>
               <a:t>Kann</a:t>
             </a:r>
             <a:r>
-              <a:rPr lang="en-US" sz="1800" b="0" dirty="0" smtClean="0"/>
+              <a:rPr lang="en-US" sz="1800" dirty="0" smtClean="0"/>
               <a:t> Memento </a:t>
             </a:r>
             <a:r>
-              <a:rPr lang="en-US" sz="1800" b="0" dirty="0" err="1" smtClean="0"/>
+              <a:rPr lang="en-US" sz="1800" dirty="0" err="1" smtClean="0"/>
               <a:t>nur</a:t>
             </a:r>
             <a:r>
-              <a:rPr lang="en-US" sz="1800" b="0" dirty="0" smtClean="0"/>
+              <a:rPr lang="en-US" sz="1800" dirty="0" smtClean="0"/>
               <a:t> </a:t>
             </a:r>
             <a:r>
-              <a:rPr lang="en-US" sz="1800" b="0" dirty="0" err="1" smtClean="0"/>
+              <a:rPr lang="en-US" sz="1800" dirty="0" err="1" smtClean="0"/>
               <a:t>weiterreichen</a:t>
             </a:r>
             <a:r>
-              <a:rPr lang="en-US" sz="1800" b="0" dirty="0" smtClean="0"/>
+              <a:rPr lang="en-US" sz="1800" dirty="0" smtClean="0"/>
               <a:t> / </a:t>
             </a:r>
             <a:r>
-              <a:rPr lang="en-US" sz="1800" b="0" dirty="0" err="1" smtClean="0"/>
+              <a:rPr lang="en-US" sz="1800" dirty="0" err="1" smtClean="0"/>
               <a:t>abspeichern</a:t>
             </a:r>
-            <a:endParaRPr lang="en-US" sz="1800" b="0" dirty="0" smtClean="0"/>
+            <a:endParaRPr lang="en-US" sz="1800" dirty="0" smtClean="0"/>
           </a:p>
           <a:p>
             <a:pPr marL="285750" indent="-285750">
@@ -7940,108 +8621,108 @@
               <a:buChar char="•"/>
             </a:pPr>
             <a:r>
-              <a:rPr lang="en-US" sz="1800" b="0" dirty="0" smtClean="0"/>
+              <a:rPr lang="en-US" sz="1800" dirty="0" smtClean="0"/>
               <a:t>Interne </a:t>
             </a:r>
             <a:r>
-              <a:rPr lang="en-US" sz="1800" b="0" dirty="0" err="1" smtClean="0"/>
+              <a:rPr lang="en-US" sz="1800" dirty="0" err="1" smtClean="0"/>
               <a:t>Daten</a:t>
             </a:r>
             <a:r>
-              <a:rPr lang="en-US" sz="1800" b="0" dirty="0" smtClean="0"/>
+              <a:rPr lang="en-US" sz="1800" dirty="0" smtClean="0"/>
               <a:t> </a:t>
             </a:r>
             <a:r>
-              <a:rPr lang="en-US" sz="1800" b="0" dirty="0" err="1" smtClean="0"/>
+              <a:rPr lang="en-US" sz="1800" dirty="0" err="1" smtClean="0"/>
               <a:t>bleiben</a:t>
             </a:r>
             <a:r>
-              <a:rPr lang="en-US" sz="1800" b="0" dirty="0" smtClean="0"/>
+              <a:rPr lang="en-US" sz="1800" dirty="0" smtClean="0"/>
               <a:t> </a:t>
             </a:r>
             <a:r>
-              <a:rPr lang="en-US" sz="1800" b="0" dirty="0" err="1" smtClean="0"/>
+              <a:rPr lang="en-US" sz="1800" dirty="0" err="1" smtClean="0"/>
               <a:t>geschützt</a:t>
             </a:r>
-            <a:endParaRPr lang="en-US" sz="1800" b="0" dirty="0" smtClean="0"/>
-          </a:p>
-          <a:p>
-            <a:endParaRPr lang="en-US" sz="1800" b="0" dirty="0" smtClean="0"/>
-          </a:p>
-          <a:p>
-            <a:r>
-              <a:rPr lang="en-US" sz="1800" b="0" dirty="0" err="1" smtClean="0"/>
+            <a:endParaRPr lang="en-US" sz="1800" dirty="0" smtClean="0"/>
+          </a:p>
+          <a:p>
+            <a:endParaRPr lang="en-US" sz="1800" dirty="0" smtClean="0"/>
+          </a:p>
+          <a:p>
+            <a:r>
+              <a:rPr lang="en-US" sz="1800" dirty="0" err="1" smtClean="0"/>
               <a:t>Allein</a:t>
             </a:r>
             <a:r>
-              <a:rPr lang="en-US" sz="1800" b="0" dirty="0" smtClean="0"/>
+              <a:rPr lang="en-US" sz="1800" dirty="0" smtClean="0"/>
               <a:t> </a:t>
             </a:r>
             <a:r>
-              <a:rPr lang="en-US" sz="1800" b="0" dirty="0"/>
+              <a:rPr lang="en-US" sz="1800" dirty="0"/>
               <a:t>der Originator hat </a:t>
             </a:r>
             <a:r>
-              <a:rPr lang="en-US" sz="1800" b="0" dirty="0" err="1"/>
+              <a:rPr lang="en-US" sz="1800" dirty="0" err="1"/>
               <a:t>vollen</a:t>
             </a:r>
             <a:r>
-              <a:rPr lang="en-US" sz="1800" b="0" dirty="0"/>
+              <a:rPr lang="en-US" sz="1800" dirty="0"/>
               <a:t> </a:t>
             </a:r>
             <a:r>
-              <a:rPr lang="en-US" sz="1800" b="0" dirty="0" err="1"/>
+              <a:rPr lang="en-US" sz="1800" dirty="0" err="1"/>
               <a:t>Zugriff</a:t>
             </a:r>
             <a:r>
-              <a:rPr lang="en-US" sz="1800" b="0" dirty="0"/>
+              <a:rPr lang="en-US" sz="1800" dirty="0"/>
               <a:t>, um </a:t>
             </a:r>
             <a:r>
-              <a:rPr lang="en-US" sz="1800" b="0" dirty="0" err="1"/>
+              <a:rPr lang="en-US" sz="1800" dirty="0" err="1"/>
               <a:t>seinen</a:t>
             </a:r>
             <a:r>
-              <a:rPr lang="en-US" sz="1800" b="0" dirty="0"/>
+              <a:rPr lang="en-US" sz="1800" dirty="0"/>
               <a:t> </a:t>
             </a:r>
             <a:r>
-              <a:rPr lang="en-US" sz="1800" b="0" dirty="0" err="1" smtClean="0"/>
+              <a:rPr lang="en-US" sz="1800" dirty="0" err="1" smtClean="0"/>
               <a:t>Zustand</a:t>
             </a:r>
             <a:r>
-              <a:rPr lang="en-US" sz="1800" b="0" dirty="0" smtClean="0"/>
+              <a:rPr lang="en-US" sz="1800" dirty="0" smtClean="0"/>
               <a:t> </a:t>
             </a:r>
             <a:r>
-              <a:rPr lang="en-US" sz="1800" b="0" dirty="0" err="1" smtClean="0"/>
+              <a:rPr lang="en-US" sz="1800" dirty="0" err="1" smtClean="0"/>
               <a:t>abzuspeichern</a:t>
             </a:r>
             <a:r>
-              <a:rPr lang="en-US" sz="1800" b="0" dirty="0" smtClean="0"/>
+              <a:rPr lang="en-US" sz="1800" dirty="0" smtClean="0"/>
               <a:t> </a:t>
             </a:r>
             <a:r>
-              <a:rPr lang="en-US" sz="1800" b="0" dirty="0" err="1"/>
+              <a:rPr lang="en-US" sz="1800" dirty="0" err="1"/>
               <a:t>bzw</a:t>
             </a:r>
             <a:r>
-              <a:rPr lang="en-US" sz="1800" b="0" dirty="0"/>
+              <a:rPr lang="en-US" sz="1800" dirty="0"/>
               <a:t>. Mementos </a:t>
             </a:r>
             <a:r>
-              <a:rPr lang="en-US" sz="1800" b="0" dirty="0" err="1"/>
+              <a:rPr lang="en-US" sz="1800" dirty="0" err="1"/>
               <a:t>Zustand</a:t>
             </a:r>
             <a:r>
-              <a:rPr lang="en-US" sz="1800" b="0" dirty="0"/>
+              <a:rPr lang="en-US" sz="1800" dirty="0"/>
               <a:t> </a:t>
             </a:r>
             <a:r>
-              <a:rPr lang="en-US" sz="1800" b="0" dirty="0" err="1"/>
+              <a:rPr lang="en-US" sz="1800" dirty="0" err="1"/>
               <a:t>auszulesen</a:t>
             </a:r>
-            <a:endParaRPr lang="en-US" sz="1800" b="0" dirty="0"/>
+            <a:endParaRPr lang="en-US" sz="1800" dirty="0"/>
           </a:p>
           <a:p>
             <a:pPr marL="285750" indent="-285750">
@@ -8049,19 +8730,19 @@
               <a:buChar char="•"/>
             </a:pPr>
             <a:r>
-              <a:rPr lang="en-US" sz="1800" b="0" dirty="0" err="1" smtClean="0"/>
+              <a:rPr lang="en-US" sz="1800" dirty="0" err="1" smtClean="0"/>
               <a:t>Begrenzt</a:t>
             </a:r>
             <a:r>
-              <a:rPr lang="en-US" sz="1800" b="0" dirty="0" smtClean="0"/>
+              <a:rPr lang="en-US" sz="1800" dirty="0" smtClean="0"/>
               <a:t> </a:t>
             </a:r>
             <a:r>
-              <a:rPr lang="en-US" sz="1800" b="0" dirty="0" err="1" smtClean="0"/>
+              <a:rPr lang="en-US" sz="1800" dirty="0" err="1" smtClean="0"/>
               <a:t>Komplexität</a:t>
             </a:r>
             <a:r>
-              <a:rPr lang="en-US" sz="1800" b="0" dirty="0" smtClean="0"/>
+              <a:rPr lang="en-US" sz="1800" dirty="0" smtClean="0"/>
               <a:t> des Originators</a:t>
             </a:r>
           </a:p>
@@ -8071,59 +8752,59 @@
               <a:buChar char="•"/>
             </a:pPr>
             <a:r>
-              <a:rPr lang="en-US" sz="1800" b="0" dirty="0" err="1" smtClean="0"/>
+              <a:rPr lang="en-US" sz="1800" dirty="0" err="1" smtClean="0"/>
               <a:t>Entlastet</a:t>
             </a:r>
             <a:r>
-              <a:rPr lang="en-US" sz="1800" b="0" dirty="0" smtClean="0"/>
+              <a:rPr lang="en-US" sz="1800" dirty="0" smtClean="0"/>
               <a:t> Originator </a:t>
             </a:r>
             <a:r>
-              <a:rPr lang="en-US" sz="1800" b="0" dirty="0" err="1" smtClean="0"/>
+              <a:rPr lang="en-US" sz="1800" dirty="0" err="1" smtClean="0"/>
               <a:t>vom</a:t>
             </a:r>
             <a:r>
-              <a:rPr lang="en-US" sz="1800" b="0" dirty="0" smtClean="0"/>
+              <a:rPr lang="en-US" sz="1800" dirty="0" smtClean="0"/>
               <a:t> </a:t>
             </a:r>
             <a:r>
-              <a:rPr lang="en-US" sz="1800" b="0" dirty="0" err="1" smtClean="0"/>
+              <a:rPr lang="en-US" sz="1800" dirty="0" err="1" smtClean="0"/>
               <a:t>Speichern</a:t>
             </a:r>
             <a:r>
-              <a:rPr lang="en-US" sz="1800" b="0" dirty="0" smtClean="0"/>
+              <a:rPr lang="en-US" sz="1800" dirty="0" smtClean="0"/>
               <a:t> seiner </a:t>
             </a:r>
             <a:r>
-              <a:rPr lang="en-US" sz="1800" b="0" dirty="0" err="1" smtClean="0"/>
+              <a:rPr lang="en-US" sz="1800" dirty="0" err="1" smtClean="0"/>
               <a:t>eigenen</a:t>
             </a:r>
             <a:r>
-              <a:rPr lang="en-US" sz="1800" b="0" dirty="0" smtClean="0"/>
+              <a:rPr lang="en-US" sz="1800" dirty="0" smtClean="0"/>
               <a:t> </a:t>
             </a:r>
             <a:r>
-              <a:rPr lang="en-US" sz="1800" b="0" dirty="0" err="1" smtClean="0"/>
+              <a:rPr lang="en-US" sz="1800" dirty="0" err="1" smtClean="0"/>
               <a:t>Zustände</a:t>
             </a:r>
-            <a:endParaRPr lang="en-US" sz="1800" b="0" dirty="0"/>
+            <a:endParaRPr lang="en-US" sz="1800" dirty="0"/>
           </a:p>
           <a:p>
             <a:pPr marL="285750" indent="-285750">
               <a:buFont typeface="Arial"/>
               <a:buChar char="•"/>
             </a:pPr>
-            <a:endParaRPr lang="en-US" sz="1800" b="0" dirty="0" smtClean="0"/>
+            <a:endParaRPr lang="en-US" sz="1800" dirty="0" smtClean="0"/>
           </a:p>
           <a:p>
             <a:pPr marL="285750" indent="-285750">
               <a:buFont typeface="Arial"/>
               <a:buChar char="•"/>
             </a:pPr>
-            <a:endParaRPr lang="en-US" sz="1800" b="0" dirty="0"/>
-          </a:p>
-          <a:p>
-            <a:endParaRPr lang="en-US" sz="1800" b="0" dirty="0"/>
+            <a:endParaRPr lang="en-US" sz="1800" dirty="0"/>
+          </a:p>
+          <a:p>
+            <a:endParaRPr lang="en-US" sz="1800" dirty="0"/>
           </a:p>
         </p:txBody>
       </p:sp>

</xml_diff>

<commit_message>
Updated presentation and related documents
</commit_message>
<xml_diff>
--- a/Project Pink/doc/tasks/task13/Memento Pattern.pptx
+++ b/Project Pink/doc/tasks/task13/Memento Pattern.pptx
@@ -5823,11 +5823,7 @@
             </a:r>
             <a:r>
               <a:rPr lang="en-US" sz="1800" dirty="0" smtClean="0"/>
-              <a:t> </a:t>
-            </a:r>
-            <a:r>
-              <a:rPr lang="en-US" sz="1800" dirty="0" smtClean="0"/>
-              <a:t>des </a:t>
+              <a:t> des </a:t>
             </a:r>
             <a:r>
               <a:rPr lang="en-US" sz="1800" dirty="0" err="1" smtClean="0"/>
@@ -5898,7 +5894,6 @@
               <a:rPr lang="en-US" sz="1800" dirty="0" smtClean="0"/>
               <a:t>:</a:t>
             </a:r>
-            <a:endParaRPr lang="en-US" sz="1800" dirty="0" smtClean="0"/>
           </a:p>
           <a:p>
             <a:pPr marL="285750" indent="-285750">
@@ -6024,6 +6019,13 @@
   <p:clrMapOvr>
     <a:masterClrMapping/>
   </p:clrMapOvr>
+  <p:timing>
+    <p:tnLst>
+      <p:par>
+        <p:cTn xmlns:p14="http://schemas.microsoft.com/office/powerpoint/2010/main" id="1" dur="indefinite" restart="never" nodeType="tmRoot"/>
+      </p:par>
+    </p:tnLst>
+  </p:timing>
 </p:sld>
 </file>
 
@@ -6405,6 +6407,13 @@
   <p:clrMapOvr>
     <a:masterClrMapping/>
   </p:clrMapOvr>
+  <p:timing>
+    <p:tnLst>
+      <p:par>
+        <p:cTn xmlns:p14="http://schemas.microsoft.com/office/powerpoint/2010/main" id="1" dur="indefinite" restart="never" nodeType="tmRoot"/>
+      </p:par>
+    </p:tnLst>
+  </p:timing>
 </p:sld>
 </file>
 
@@ -6747,6 +6756,13 @@
   <p:clrMapOvr>
     <a:masterClrMapping/>
   </p:clrMapOvr>
+  <p:timing>
+    <p:tnLst>
+      <p:par>
+        <p:cTn xmlns:p14="http://schemas.microsoft.com/office/powerpoint/2010/main" id="1" dur="indefinite" restart="never" nodeType="tmRoot"/>
+      </p:par>
+    </p:tnLst>
+  </p:timing>
 </p:sld>
 </file>
 
@@ -6784,7 +6800,11 @@
           <a:p>
             <a:r>
               <a:rPr lang="en-US" dirty="0" smtClean="0"/>
-              <a:t>Memento: Things to consider</a:t>
+              <a:t>Memento: </a:t>
+            </a:r>
+            <a:r>
+              <a:rPr lang="en-US" dirty="0" smtClean="0"/>
+              <a:t>STOLPERSTEINE</a:t>
             </a:r>
             <a:endParaRPr lang="en-US" dirty="0"/>
           </a:p>
@@ -6859,13 +6879,25 @@
               <a:rPr lang="en-US" sz="1800" dirty="0" smtClean="0">
                 <a:sym typeface="Wingdings"/>
               </a:rPr>
-              <a:t>Handling von </a:t>
+              <a:t>“Undo-</a:t>
             </a:r>
             <a:r>
               <a:rPr lang="en-US" sz="1800" dirty="0" err="1" smtClean="0">
                 <a:sym typeface="Wingdings"/>
               </a:rPr>
-              <a:t>gesicherten</a:t>
+              <a:t>Funktion</a:t>
+            </a:r>
+            <a:r>
+              <a:rPr lang="en-US" sz="1800" dirty="0" smtClean="0">
+                <a:sym typeface="Wingdings"/>
+              </a:rPr>
+              <a:t>” </a:t>
+            </a:r>
+            <a:r>
+              <a:rPr lang="en-US" sz="1800" dirty="0" err="1" smtClean="0">
+                <a:sym typeface="Wingdings"/>
+              </a:rPr>
+              <a:t>ist</a:t>
             </a:r>
             <a:r>
               <a:rPr lang="en-US" sz="1800" dirty="0" smtClean="0">
@@ -6874,10 +6906,28 @@
               <a:t> </a:t>
             </a:r>
             <a:r>
+              <a:rPr lang="en-US" sz="1800" dirty="0" smtClean="0">
+                <a:sym typeface="Wingdings"/>
+              </a:rPr>
+              <a:t>in </a:t>
+            </a:r>
+            <a:r>
               <a:rPr lang="en-US" sz="1800" dirty="0" err="1" smtClean="0">
                 <a:sym typeface="Wingdings"/>
               </a:rPr>
-              <a:t>Stati</a:t>
+              <a:t>einem</a:t>
+            </a:r>
+            <a:r>
+              <a:rPr lang="en-US" sz="1800" dirty="0" smtClean="0">
+                <a:sym typeface="Wingdings"/>
+              </a:rPr>
+              <a:t> Browser </a:t>
+            </a:r>
+            <a:r>
+              <a:rPr lang="en-US" sz="1800" dirty="0" err="1" smtClean="0">
+                <a:sym typeface="Wingdings"/>
+              </a:rPr>
+              <a:t>bereits</a:t>
             </a:r>
             <a:r>
               <a:rPr lang="en-US" sz="1800" dirty="0" smtClean="0">
@@ -6889,50 +6939,8 @@
               <a:rPr lang="en-US" sz="1800" dirty="0" err="1" smtClean="0">
                 <a:sym typeface="Wingdings"/>
               </a:rPr>
-              <a:t>kann</a:t>
-            </a:r>
-            <a:r>
-              <a:rPr lang="en-US" sz="1800" dirty="0" smtClean="0">
-                <a:sym typeface="Wingdings"/>
-              </a:rPr>
-              <a:t> </a:t>
-            </a:r>
-            <a:r>
-              <a:rPr lang="en-US" sz="1800" dirty="0" err="1" smtClean="0">
-                <a:sym typeface="Wingdings"/>
-              </a:rPr>
-              <a:t>aufwändig</a:t>
-            </a:r>
-            <a:r>
-              <a:rPr lang="en-US" sz="1800" dirty="0" smtClean="0">
-                <a:sym typeface="Wingdings"/>
-              </a:rPr>
-              <a:t> </a:t>
-            </a:r>
-            <a:r>
-              <a:rPr lang="en-US" sz="1800" dirty="0" err="1" smtClean="0">
-                <a:sym typeface="Wingdings"/>
-              </a:rPr>
-              <a:t>sein</a:t>
-            </a:r>
-            <a:endParaRPr lang="en-US" sz="1800" dirty="0" smtClean="0">
-              <a:sym typeface="Wingdings"/>
-            </a:endParaRPr>
-          </a:p>
-          <a:p>
-            <a:pPr marL="285750" indent="-285750">
-              <a:buFont typeface="Arial"/>
-              <a:buChar char="•"/>
-            </a:pPr>
-            <a:endParaRPr lang="en-US" sz="1800" dirty="0">
-              <a:sym typeface="Wingdings"/>
-            </a:endParaRPr>
-          </a:p>
-          <a:p>
-            <a:pPr marL="285750" indent="-285750">
-              <a:buFont typeface="Arial"/>
-              <a:buChar char="•"/>
-            </a:pPr>
+              <a:t>implementiert</a:t>
+            </a:r>
             <a:endParaRPr lang="en-US" sz="1800" dirty="0" smtClean="0">
               <a:sym typeface="Wingdings"/>
             </a:endParaRPr>
@@ -6965,6 +6973,13 @@
   <p:clrMapOvr>
     <a:masterClrMapping/>
   </p:clrMapOvr>
+  <p:timing>
+    <p:tnLst>
+      <p:par>
+        <p:cTn xmlns:p14="http://schemas.microsoft.com/office/powerpoint/2010/main" id="1" dur="indefinite" restart="never" nodeType="tmRoot"/>
+      </p:par>
+    </p:tnLst>
+  </p:timing>
 </p:sld>
 </file>
 
@@ -7037,6 +7052,13 @@
   <p:clrMapOvr>
     <a:masterClrMapping/>
   </p:clrMapOvr>
+  <p:timing>
+    <p:tnLst>
+      <p:par>
+        <p:cTn xmlns:p14="http://schemas.microsoft.com/office/powerpoint/2010/main" id="1" dur="indefinite" restart="never" nodeType="tmRoot"/>
+      </p:par>
+    </p:tnLst>
+  </p:timing>
 </p:sld>
 </file>
 
@@ -7447,40 +7469,40 @@
           <a:lstStyle/>
           <a:p>
             <a:r>
-              <a:rPr lang="en-US" sz="1800" b="0" dirty="0" err="1" smtClean="0"/>
+              <a:rPr lang="en-US" sz="1800" dirty="0" err="1" smtClean="0"/>
               <a:t>Objekt</a:t>
             </a:r>
             <a:r>
-              <a:rPr lang="en-US" sz="1800" b="0" dirty="0" smtClean="0"/>
+              <a:rPr lang="en-US" sz="1800" dirty="0" smtClean="0"/>
               <a:t>, welches </a:t>
             </a:r>
             <a:r>
-              <a:rPr lang="en-US" sz="1800" b="0" dirty="0" err="1" smtClean="0"/>
+              <a:rPr lang="en-US" sz="1800" dirty="0" err="1" smtClean="0"/>
               <a:t>es</a:t>
             </a:r>
             <a:r>
-              <a:rPr lang="en-US" sz="1800" b="0" dirty="0" smtClean="0"/>
+              <a:rPr lang="en-US" sz="1800" dirty="0" smtClean="0"/>
               <a:t> </a:t>
             </a:r>
             <a:r>
-              <a:rPr lang="en-US" sz="1800" b="0" dirty="0" err="1" smtClean="0"/>
+              <a:rPr lang="en-US" sz="1800" dirty="0" err="1" smtClean="0"/>
               <a:t>zu</a:t>
             </a:r>
             <a:r>
-              <a:rPr lang="en-US" sz="1800" b="0" dirty="0" smtClean="0"/>
+              <a:rPr lang="en-US" sz="1800" dirty="0" smtClean="0"/>
               <a:t> </a:t>
             </a:r>
             <a:r>
-              <a:rPr lang="en-US" sz="1800" b="0" dirty="0" err="1" smtClean="0"/>
+              <a:rPr lang="en-US" sz="1800" dirty="0" err="1" smtClean="0"/>
               <a:t>verwalten</a:t>
             </a:r>
             <a:r>
-              <a:rPr lang="en-US" sz="1800" b="0" dirty="0" smtClean="0"/>
+              <a:rPr lang="en-US" sz="1800" dirty="0" smtClean="0"/>
               <a:t> gilt.</a:t>
             </a:r>
           </a:p>
           <a:p>
-            <a:endParaRPr lang="en-US" sz="1800" b="0" dirty="0"/>
+            <a:endParaRPr lang="en-US" sz="1800" dirty="0"/>
           </a:p>
           <a:p>
             <a:pPr marL="457200" indent="-457200">
@@ -7488,15 +7510,15 @@
               <a:buChar char="•"/>
             </a:pPr>
             <a:r>
-              <a:rPr lang="en-US" sz="1800" b="0" dirty="0" smtClean="0"/>
+              <a:rPr lang="en-US" sz="1800" dirty="0" smtClean="0"/>
               <a:t>Hat </a:t>
             </a:r>
             <a:r>
-              <a:rPr lang="en-US" sz="1800" b="0" dirty="0" err="1" smtClean="0"/>
+              <a:rPr lang="en-US" sz="1800" dirty="0" err="1" smtClean="0"/>
               <a:t>einen</a:t>
             </a:r>
             <a:r>
-              <a:rPr lang="en-US" sz="1800" b="0" dirty="0" smtClean="0"/>
+              <a:rPr lang="en-US" sz="1800" dirty="0" smtClean="0"/>
               <a:t> ‘state’</a:t>
             </a:r>
           </a:p>
@@ -7505,7 +7527,7 @@
               <a:buFont typeface="Arial"/>
               <a:buChar char="•"/>
             </a:pPr>
-            <a:endParaRPr lang="en-US" sz="1800" b="0" dirty="0" smtClean="0"/>
+            <a:endParaRPr lang="en-US" sz="1800" dirty="0" smtClean="0"/>
           </a:p>
           <a:p>
             <a:pPr marL="457200" indent="-457200">
@@ -7513,14 +7535,14 @@
               <a:buChar char="•"/>
             </a:pPr>
             <a:r>
-              <a:rPr lang="en-US" sz="1800" b="0" dirty="0" err="1" smtClean="0"/>
+              <a:rPr lang="en-US" sz="1800" dirty="0" err="1" smtClean="0"/>
               <a:t>Methoden</a:t>
             </a:r>
             <a:r>
-              <a:rPr lang="en-US" sz="1800" b="0" dirty="0" smtClean="0"/>
+              <a:rPr lang="en-US" sz="1800" dirty="0" smtClean="0"/>
               <a:t>:</a:t>
             </a:r>
-            <a:endParaRPr lang="en-US" sz="1800" b="0" dirty="0"/>
+            <a:endParaRPr lang="en-US" sz="1800" dirty="0"/>
           </a:p>
           <a:p>
             <a:pPr marL="0" indent="0"/>
@@ -7732,26 +7754,26 @@
           <a:lstStyle/>
           <a:p>
             <a:r>
-              <a:rPr lang="en-US" sz="1800" b="0" dirty="0" smtClean="0"/>
+              <a:rPr lang="en-US" sz="1800" dirty="0" smtClean="0"/>
               <a:t>Container, </a:t>
             </a:r>
             <a:r>
-              <a:rPr lang="en-US" sz="1800" b="0" dirty="0" err="1" smtClean="0"/>
+              <a:rPr lang="en-US" sz="1800" dirty="0" err="1" smtClean="0"/>
               <a:t>welcher</a:t>
             </a:r>
             <a:r>
-              <a:rPr lang="en-US" sz="1800" b="0" dirty="0" smtClean="0"/>
+              <a:rPr lang="en-US" sz="1800" dirty="0" smtClean="0"/>
               <a:t> den Status des Originators </a:t>
             </a:r>
             <a:r>
-              <a:rPr lang="en-US" sz="1800" b="0" dirty="0" err="1" smtClean="0"/>
+              <a:rPr lang="en-US" sz="1800" dirty="0" err="1" smtClean="0"/>
               <a:t>speichert</a:t>
             </a:r>
-            <a:endParaRPr lang="en-US" sz="1800" b="0" dirty="0" smtClean="0"/>
+            <a:endParaRPr lang="en-US" sz="1800" dirty="0" smtClean="0"/>
           </a:p>
           <a:p>
             <a:pPr marL="0" indent="0"/>
-            <a:endParaRPr lang="en-US" sz="1800" b="0" dirty="0" smtClean="0"/>
+            <a:endParaRPr lang="en-US" sz="1800" dirty="0" smtClean="0"/>
           </a:p>
           <a:p>
             <a:pPr marL="457200" indent="-457200">
@@ -7759,14 +7781,14 @@
               <a:buChar char="•"/>
             </a:pPr>
             <a:r>
-              <a:rPr lang="en-US" sz="1800" b="0" dirty="0" err="1" smtClean="0"/>
+              <a:rPr lang="en-US" sz="1800" dirty="0" err="1" smtClean="0"/>
               <a:t>Methoden</a:t>
             </a:r>
             <a:r>
-              <a:rPr lang="en-US" sz="1800" b="0" dirty="0" smtClean="0"/>
+              <a:rPr lang="en-US" sz="1800" dirty="0" smtClean="0"/>
               <a:t>:</a:t>
             </a:r>
-            <a:endParaRPr lang="en-US" sz="1800" b="0" dirty="0"/>
+            <a:endParaRPr lang="en-US" sz="1800" dirty="0"/>
           </a:p>
           <a:p>
             <a:pPr marL="0" indent="0"/>
@@ -7978,29 +8000,29 @@
           <a:lstStyle/>
           <a:p>
             <a:r>
-              <a:rPr lang="en-US" sz="1800" b="0" dirty="0" err="1" smtClean="0"/>
+              <a:rPr lang="en-US" sz="1800" dirty="0" err="1" smtClean="0"/>
               <a:t>Klasse</a:t>
             </a:r>
             <a:r>
-              <a:rPr lang="en-US" sz="1800" b="0" dirty="0" smtClean="0"/>
+              <a:rPr lang="en-US" sz="1800" dirty="0" smtClean="0"/>
               <a:t>, die den Undo-</a:t>
             </a:r>
             <a:r>
-              <a:rPr lang="en-US" sz="1800" b="0" dirty="0" err="1" smtClean="0"/>
+              <a:rPr lang="en-US" sz="1800" dirty="0" err="1" smtClean="0"/>
               <a:t>Befehl</a:t>
             </a:r>
             <a:r>
-              <a:rPr lang="en-US" sz="1800" b="0" dirty="0" smtClean="0"/>
+              <a:rPr lang="en-US" sz="1800" dirty="0" smtClean="0"/>
               <a:t> </a:t>
             </a:r>
             <a:r>
-              <a:rPr lang="en-US" sz="1800" b="0" dirty="0" err="1" smtClean="0"/>
+              <a:rPr lang="en-US" sz="1800" dirty="0" err="1" smtClean="0"/>
               <a:t>auslöst</a:t>
             </a:r>
-            <a:endParaRPr lang="en-US" sz="1800" b="0" dirty="0" smtClean="0"/>
-          </a:p>
-          <a:p>
-            <a:endParaRPr lang="en-US" sz="1800" b="0" dirty="0"/>
+            <a:endParaRPr lang="en-US" sz="1800" dirty="0" smtClean="0"/>
+          </a:p>
+          <a:p>
+            <a:endParaRPr lang="en-US" sz="1800" dirty="0"/>
           </a:p>
           <a:p>
             <a:pPr>
@@ -8008,29 +8030,29 @@
               <a:buChar char="•"/>
             </a:pPr>
             <a:r>
-              <a:rPr lang="en-US" sz="1800" b="0" dirty="0" smtClean="0"/>
+              <a:rPr lang="en-US" sz="1800" dirty="0" smtClean="0"/>
               <a:t>Hat </a:t>
             </a:r>
             <a:r>
-              <a:rPr lang="en-US" sz="1800" b="0" dirty="0" err="1" smtClean="0"/>
+              <a:rPr lang="en-US" sz="1800" dirty="0" err="1" smtClean="0"/>
               <a:t>Liste</a:t>
             </a:r>
             <a:r>
-              <a:rPr lang="en-US" sz="1800" b="0" dirty="0" smtClean="0"/>
+              <a:rPr lang="en-US" sz="1800" dirty="0" smtClean="0"/>
               <a:t> </a:t>
             </a:r>
             <a:r>
-              <a:rPr lang="en-US" sz="1800" b="0" dirty="0" err="1" smtClean="0"/>
+              <a:rPr lang="en-US" sz="1800" dirty="0" err="1" smtClean="0"/>
               <a:t>mit</a:t>
             </a:r>
             <a:r>
-              <a:rPr lang="en-US" sz="1800" b="0" dirty="0" smtClean="0"/>
+              <a:rPr lang="en-US" sz="1800" dirty="0" smtClean="0"/>
               <a:t> Mementos</a:t>
             </a:r>
           </a:p>
           <a:p>
             <a:pPr marL="0" indent="0"/>
-            <a:endParaRPr lang="en-US" sz="1800" b="0" dirty="0" smtClean="0"/>
+            <a:endParaRPr lang="en-US" sz="1800" dirty="0" smtClean="0"/>
           </a:p>
           <a:p>
             <a:pPr marL="457200" indent="-457200">
@@ -8038,14 +8060,14 @@
               <a:buChar char="•"/>
             </a:pPr>
             <a:r>
-              <a:rPr lang="en-US" sz="1800" b="0" dirty="0" err="1" smtClean="0"/>
+              <a:rPr lang="en-US" sz="1800" dirty="0" err="1" smtClean="0"/>
               <a:t>Methoden</a:t>
             </a:r>
             <a:r>
-              <a:rPr lang="en-US" sz="1800" b="0" dirty="0" smtClean="0"/>
+              <a:rPr lang="en-US" sz="1800" dirty="0" smtClean="0"/>
               <a:t>:</a:t>
             </a:r>
-            <a:endParaRPr lang="en-US" sz="1800" b="0" dirty="0"/>
+            <a:endParaRPr lang="en-US" sz="1800" dirty="0"/>
           </a:p>
           <a:p>
             <a:pPr marL="0" indent="0"/>

</xml_diff>

<commit_message>
Updated presentation and related documents from friday
</commit_message>
<xml_diff>
--- a/Project Pink/doc/tasks/task13/Memento Pattern.pptx
+++ b/Project Pink/doc/tasks/task13/Memento Pattern.pptx
@@ -5,7 +5,7 @@
     <p:sldMasterId id="2147483660" r:id="rId1"/>
   </p:sldMasterIdLst>
   <p:notesMasterIdLst>
-    <p:notesMasterId r:id="rId17"/>
+    <p:notesMasterId r:id="rId18"/>
   </p:notesMasterIdLst>
   <p:sldIdLst>
     <p:sldId id="256" r:id="rId2"/>
@@ -21,8 +21,9 @@
     <p:sldId id="258" r:id="rId12"/>
     <p:sldId id="266" r:id="rId13"/>
     <p:sldId id="268" r:id="rId14"/>
-    <p:sldId id="269" r:id="rId15"/>
-    <p:sldId id="271" r:id="rId16"/>
+    <p:sldId id="272" r:id="rId15"/>
+    <p:sldId id="269" r:id="rId16"/>
+    <p:sldId id="271" r:id="rId17"/>
   </p:sldIdLst>
   <p:sldSz cx="9144000" cy="6858000" type="screen4x3"/>
   <p:notesSz cx="6858000" cy="9144000"/>
@@ -236,7 +237,7 @@
           <a:p>
             <a:fld id="{473F7A02-9615-F248-8584-8BE3A942EA01}" type="datetimeFigureOut">
               <a:rPr lang="en-US" smtClean="0"/>
-              <a:t>16.05.13</a:t>
+              <a:t>17.05.13</a:t>
             </a:fld>
             <a:endParaRPr lang="en-US"/>
           </a:p>
@@ -849,6 +850,102 @@
     <p:extLst>
       <p:ext uri="{BB962C8B-B14F-4D97-AF65-F5344CB8AC3E}">
         <p14:creationId xmlns:p14="http://schemas.microsoft.com/office/powerpoint/2010/main" val="2934028038"/>
+      </p:ext>
+    </p:extLst>
+  </p:cSld>
+  <p:clrMapOvr>
+    <a:masterClrMapping/>
+  </p:clrMapOvr>
+</p:notes>
+</file>
+
+<file path=ppt/notesSlides/notesSlide3.xml><?xml version="1.0" encoding="utf-8"?>
+<p:notes xmlns:a="http://schemas.openxmlformats.org/drawingml/2006/main" xmlns:r="http://schemas.openxmlformats.org/officeDocument/2006/relationships" xmlns:p="http://schemas.openxmlformats.org/presentationml/2006/main">
+  <p:cSld>
+    <p:spTree>
+      <p:nvGrpSpPr>
+        <p:cNvPr id="1" name=""/>
+        <p:cNvGrpSpPr/>
+        <p:nvPr/>
+      </p:nvGrpSpPr>
+      <p:grpSpPr>
+        <a:xfrm>
+          <a:off x="0" y="0"/>
+          <a:ext cx="0" cy="0"/>
+          <a:chOff x="0" y="0"/>
+          <a:chExt cx="0" cy="0"/>
+        </a:xfrm>
+      </p:grpSpPr>
+      <p:sp>
+        <p:nvSpPr>
+          <p:cNvPr id="2" name="Slide Image Placeholder 1"/>
+          <p:cNvSpPr>
+            <a:spLocks noGrp="1" noRot="1" noChangeAspect="1"/>
+          </p:cNvSpPr>
+          <p:nvPr>
+            <p:ph type="sldImg"/>
+          </p:nvPr>
+        </p:nvSpPr>
+        <p:spPr/>
+      </p:sp>
+      <p:sp>
+        <p:nvSpPr>
+          <p:cNvPr id="3" name="Notes Placeholder 2"/>
+          <p:cNvSpPr>
+            <a:spLocks noGrp="1"/>
+          </p:cNvSpPr>
+          <p:nvPr>
+            <p:ph type="body" idx="1"/>
+          </p:nvPr>
+        </p:nvSpPr>
+        <p:spPr/>
+        <p:txBody>
+          <a:bodyPr/>
+          <a:lstStyle/>
+          <a:p>
+            <a:r>
+              <a:rPr lang="en-US" dirty="0" smtClean="0"/>
+              <a:t>Without violating encapsulation, capture and externalize an object’s internal state so that the object can be returned to this state later.</a:t>
+            </a:r>
+          </a:p>
+          <a:p>
+            <a:r>
+              <a:rPr lang="en-US" dirty="0" smtClean="0"/>
+              <a:t>A magic cookie that encapsulates a “check point” capability.</a:t>
+            </a:r>
+          </a:p>
+          <a:p>
+            <a:endParaRPr lang="en-US" dirty="0" smtClean="0"/>
+          </a:p>
+        </p:txBody>
+      </p:sp>
+      <p:sp>
+        <p:nvSpPr>
+          <p:cNvPr id="4" name="Slide Number Placeholder 3"/>
+          <p:cNvSpPr>
+            <a:spLocks noGrp="1"/>
+          </p:cNvSpPr>
+          <p:nvPr>
+            <p:ph type="sldNum" sz="quarter" idx="10"/>
+          </p:nvPr>
+        </p:nvSpPr>
+        <p:spPr/>
+        <p:txBody>
+          <a:bodyPr/>
+          <a:lstStyle/>
+          <a:p>
+            <a:fld id="{C04B1876-72B1-F048-809B-046DC6EA2E01}" type="slidenum">
+              <a:rPr lang="en-US" smtClean="0"/>
+              <a:t>10</a:t>
+            </a:fld>
+            <a:endParaRPr lang="en-US"/>
+          </a:p>
+        </p:txBody>
+      </p:sp>
+    </p:spTree>
+    <p:extLst>
+      <p:ext uri="{BB962C8B-B14F-4D97-AF65-F5344CB8AC3E}">
+        <p14:creationId xmlns:p14="http://schemas.microsoft.com/office/powerpoint/2010/main" val="3583248440"/>
       </p:ext>
     </p:extLst>
   </p:cSld>
@@ -5707,45 +5804,208 @@
           <a:lstStyle/>
           <a:p>
             <a:r>
-              <a:rPr lang="en-US" sz="1800" b="0" dirty="0" smtClean="0"/>
-              <a:t>+ </a:t>
-            </a:r>
-            <a:r>
-              <a:rPr lang="en-US" sz="1800" b="0" dirty="0" err="1" smtClean="0"/>
+              <a:rPr lang="en-US" sz="1800" dirty="0" err="1" smtClean="0"/>
+              <a:t>Vorteile</a:t>
+            </a:r>
+            <a:r>
+              <a:rPr lang="en-US" sz="1800" dirty="0" smtClean="0"/>
+              <a:t>:</a:t>
+            </a:r>
+          </a:p>
+          <a:p>
+            <a:pPr marL="285750" indent="-285750">
+              <a:buFont typeface="Arial"/>
+              <a:buChar char="•"/>
+            </a:pPr>
+            <a:r>
+              <a:rPr lang="en-US" sz="1800" dirty="0" err="1" smtClean="0"/>
               <a:t>Kapselung</a:t>
             </a:r>
             <a:r>
-              <a:rPr lang="en-US" sz="1800" b="0" dirty="0" smtClean="0"/>
+              <a:rPr lang="en-US" sz="1800" dirty="0" smtClean="0"/>
               <a:t> des </a:t>
             </a:r>
             <a:r>
-              <a:rPr lang="en-US" sz="1800" b="0" dirty="0" err="1" smtClean="0"/>
+              <a:rPr lang="en-US" sz="1800" dirty="0" err="1" smtClean="0"/>
               <a:t>Objekts</a:t>
             </a:r>
             <a:r>
-              <a:rPr lang="en-US" sz="1800" b="0" dirty="0" smtClean="0"/>
+              <a:rPr lang="en-US" sz="1800" dirty="0" smtClean="0"/>
               <a:t> </a:t>
             </a:r>
             <a:r>
-              <a:rPr lang="en-US" sz="1800" b="0" dirty="0" err="1" smtClean="0"/>
+              <a:rPr lang="en-US" sz="1800" dirty="0" err="1" smtClean="0"/>
               <a:t>bleibt</a:t>
             </a:r>
             <a:r>
-              <a:rPr lang="en-US" sz="1800" b="0" dirty="0" smtClean="0"/>
+              <a:rPr lang="en-US" sz="1800" dirty="0" smtClean="0"/>
               <a:t> </a:t>
             </a:r>
             <a:r>
-              <a:rPr lang="en-US" sz="1800" b="0" dirty="0" err="1" smtClean="0"/>
+              <a:rPr lang="en-US" sz="1800" dirty="0" err="1" smtClean="0"/>
               <a:t>erhalten</a:t>
             </a:r>
-            <a:endParaRPr lang="en-US" sz="1800" b="0" dirty="0" smtClean="0"/>
-          </a:p>
-          <a:p>
-            <a:r>
-              <a:rPr lang="en-US" sz="1800" b="0" dirty="0" smtClean="0"/>
-              <a:t>+ </a:t>
-            </a:r>
-            <a:endParaRPr lang="en-US" sz="1800" b="0" dirty="0"/>
+            <a:endParaRPr lang="en-US" sz="1800" dirty="0" smtClean="0"/>
+          </a:p>
+          <a:p>
+            <a:pPr marL="285750" indent="-285750">
+              <a:buFont typeface="Arial"/>
+              <a:buChar char="•"/>
+            </a:pPr>
+            <a:r>
+              <a:rPr lang="en-US" sz="1800" dirty="0" err="1" smtClean="0"/>
+              <a:t>Anzahl</a:t>
+            </a:r>
+            <a:r>
+              <a:rPr lang="en-US" sz="1800" dirty="0" smtClean="0"/>
+              <a:t> </a:t>
+            </a:r>
+            <a:r>
+              <a:rPr lang="en-US" sz="1800" dirty="0" err="1" smtClean="0"/>
+              <a:t>gespeicherter</a:t>
+            </a:r>
+            <a:r>
+              <a:rPr lang="en-US" sz="1800" dirty="0" smtClean="0"/>
+              <a:t> </a:t>
+            </a:r>
+            <a:r>
+              <a:rPr lang="en-US" sz="1800" dirty="0" err="1" smtClean="0"/>
+              <a:t>Stati</a:t>
+            </a:r>
+            <a:r>
+              <a:rPr lang="en-US" sz="1800" dirty="0" smtClean="0"/>
+              <a:t> </a:t>
+            </a:r>
+            <a:r>
+              <a:rPr lang="en-US" sz="1800" dirty="0" err="1" smtClean="0"/>
+              <a:t>flexibel</a:t>
+            </a:r>
+            <a:endParaRPr lang="en-US" sz="1800" dirty="0" smtClean="0"/>
+          </a:p>
+          <a:p>
+            <a:endParaRPr lang="en-US" sz="1800" dirty="0" smtClean="0"/>
+          </a:p>
+          <a:p>
+            <a:r>
+              <a:rPr lang="en-US" sz="1800" dirty="0" err="1" smtClean="0"/>
+              <a:t>Nachteile</a:t>
+            </a:r>
+            <a:r>
+              <a:rPr lang="en-US" sz="1800" dirty="0" smtClean="0"/>
+              <a:t>:</a:t>
+            </a:r>
+          </a:p>
+          <a:p>
+            <a:pPr marL="285750" indent="-285750">
+              <a:buFont typeface="Arial"/>
+              <a:buChar char="•"/>
+            </a:pPr>
+            <a:r>
+              <a:rPr lang="en-US" sz="1800" dirty="0" err="1" smtClean="0"/>
+              <a:t>Nicht</a:t>
+            </a:r>
+            <a:r>
+              <a:rPr lang="en-US" sz="1800" dirty="0" smtClean="0"/>
+              <a:t> </a:t>
+            </a:r>
+            <a:r>
+              <a:rPr lang="en-US" sz="1800" dirty="0" err="1" smtClean="0"/>
+              <a:t>alle</a:t>
+            </a:r>
+            <a:r>
+              <a:rPr lang="en-US" sz="1800" dirty="0" smtClean="0"/>
+              <a:t> </a:t>
+            </a:r>
+            <a:r>
+              <a:rPr lang="en-US" sz="1800" dirty="0" err="1" smtClean="0"/>
+              <a:t>Stati</a:t>
+            </a:r>
+            <a:r>
+              <a:rPr lang="en-US" sz="1800" dirty="0" smtClean="0"/>
+              <a:t> </a:t>
+            </a:r>
+            <a:r>
+              <a:rPr lang="en-US" sz="1800" dirty="0" err="1" smtClean="0"/>
+              <a:t>lassen</a:t>
+            </a:r>
+            <a:r>
+              <a:rPr lang="en-US" sz="1800" dirty="0" smtClean="0"/>
+              <a:t> </a:t>
+            </a:r>
+            <a:r>
+              <a:rPr lang="en-US" sz="1800" dirty="0" err="1" smtClean="0"/>
+              <a:t>sich</a:t>
+            </a:r>
+            <a:r>
+              <a:rPr lang="en-US" sz="1800" dirty="0" smtClean="0"/>
+              <a:t> </a:t>
+            </a:r>
+            <a:r>
+              <a:rPr lang="en-US" sz="1800" dirty="0" err="1" smtClean="0"/>
+              <a:t>speichern</a:t>
+            </a:r>
+            <a:endParaRPr lang="en-US" sz="1800" dirty="0" smtClean="0"/>
+          </a:p>
+          <a:p>
+            <a:pPr marL="285750" indent="-285750">
+              <a:buFont typeface="Arial"/>
+              <a:buChar char="•"/>
+            </a:pPr>
+            <a:r>
+              <a:rPr lang="en-US" sz="1800" dirty="0" smtClean="0"/>
+              <a:t>Overhead, Memento </a:t>
+            </a:r>
+            <a:r>
+              <a:rPr lang="en-US" sz="1800" dirty="0" err="1" smtClean="0"/>
+              <a:t>ist</a:t>
+            </a:r>
+            <a:r>
+              <a:rPr lang="en-US" sz="1800" dirty="0" smtClean="0"/>
+              <a:t> </a:t>
+            </a:r>
+            <a:r>
+              <a:rPr lang="en-US" sz="1800" dirty="0" err="1" smtClean="0"/>
+              <a:t>aufwändig</a:t>
+            </a:r>
+            <a:r>
+              <a:rPr lang="en-US" sz="1800" dirty="0" smtClean="0"/>
+              <a:t> </a:t>
+            </a:r>
+            <a:r>
+              <a:rPr lang="en-US" sz="1800" dirty="0" err="1" smtClean="0"/>
+              <a:t>zum</a:t>
+            </a:r>
+            <a:r>
+              <a:rPr lang="en-US" sz="1800" dirty="0" smtClean="0"/>
+              <a:t> </a:t>
+            </a:r>
+            <a:r>
+              <a:rPr lang="en-US" sz="1800" dirty="0" err="1" smtClean="0"/>
+              <a:t>ein</a:t>
+            </a:r>
+            <a:r>
+              <a:rPr lang="en-US" sz="1800" dirty="0" smtClean="0"/>
+              <a:t>- und </a:t>
+            </a:r>
+            <a:r>
+              <a:rPr lang="en-US" sz="1800" dirty="0" err="1" smtClean="0"/>
+              <a:t>auspacken</a:t>
+            </a:r>
+            <a:endParaRPr lang="en-US" sz="1800" dirty="0" smtClean="0"/>
+          </a:p>
+          <a:p>
+            <a:pPr marL="285750" indent="-285750">
+              <a:buFontTx/>
+              <a:buChar char="-"/>
+            </a:pPr>
+            <a:endParaRPr lang="en-US" sz="1800" dirty="0" smtClean="0"/>
+          </a:p>
+          <a:p>
+            <a:pPr marL="285750" indent="-285750">
+              <a:buFontTx/>
+              <a:buChar char="-"/>
+            </a:pPr>
+            <a:endParaRPr lang="en-US" sz="1800" dirty="0"/>
           </a:p>
         </p:txBody>
       </p:sp>
@@ -5759,6 +6019,13 @@
   <p:clrMapOvr>
     <a:masterClrMapping/>
   </p:clrMapOvr>
+  <p:timing>
+    <p:tnLst>
+      <p:par>
+        <p:cTn xmlns:p14="http://schemas.microsoft.com/office/powerpoint/2010/main" id="1" dur="indefinite" restart="never" nodeType="tmRoot"/>
+      </p:par>
+    </p:tnLst>
+  </p:timing>
 </p:sld>
 </file>
 
@@ -5910,7 +6177,7 @@
           </a:bodyPr>
           <a:lstStyle/>
           <a:p>
-            <a:endParaRPr lang="en-US" sz="1800" b="0" dirty="0" smtClean="0"/>
+            <a:endParaRPr lang="en-US" sz="1800" dirty="0" smtClean="0"/>
           </a:p>
           <a:p>
             <a:pPr marL="285750" indent="-285750">
@@ -5918,7 +6185,7 @@
               <a:buChar char="•"/>
             </a:pPr>
             <a:r>
-              <a:rPr lang="en-US" sz="1800" b="0" dirty="0" smtClean="0"/>
+              <a:rPr lang="en-US" sz="1800" dirty="0" smtClean="0"/>
               <a:t>Caretaker: Editor</a:t>
             </a:r>
           </a:p>
@@ -5927,7 +6194,7 @@
               <a:buFont typeface="Arial"/>
               <a:buChar char="•"/>
             </a:pPr>
-            <a:endParaRPr lang="en-US" sz="1800" b="0" dirty="0" smtClean="0"/>
+            <a:endParaRPr lang="en-US" sz="1800" dirty="0" smtClean="0"/>
           </a:p>
           <a:p>
             <a:pPr marL="285750" indent="-285750">
@@ -5935,23 +6202,23 @@
               <a:buChar char="•"/>
             </a:pPr>
             <a:r>
-              <a:rPr lang="en-US" sz="1800" b="0" dirty="0" smtClean="0"/>
+              <a:rPr lang="en-US" sz="1800" dirty="0" smtClean="0"/>
               <a:t>Originator: Textbox (</a:t>
             </a:r>
             <a:r>
-              <a:rPr lang="en-US" sz="1800" b="0" dirty="0" err="1" smtClean="0"/>
+              <a:rPr lang="en-US" sz="1800" dirty="0" err="1" smtClean="0"/>
               <a:t>mit</a:t>
             </a:r>
             <a:r>
-              <a:rPr lang="en-US" sz="1800" b="0" dirty="0" smtClean="0"/>
+              <a:rPr lang="en-US" sz="1800" dirty="0" smtClean="0"/>
               <a:t> </a:t>
             </a:r>
             <a:r>
-              <a:rPr lang="en-US" sz="1800" b="0" dirty="0" err="1" smtClean="0"/>
+              <a:rPr lang="en-US" sz="1800" dirty="0" err="1" smtClean="0"/>
               <a:t>internem</a:t>
             </a:r>
             <a:r>
-              <a:rPr lang="en-US" sz="1800" b="0" dirty="0" smtClean="0"/>
+              <a:rPr lang="en-US" sz="1800" dirty="0" smtClean="0"/>
               <a:t> Status “Text”)</a:t>
             </a:r>
           </a:p>
@@ -5960,7 +6227,7 @@
               <a:buFont typeface="Arial"/>
               <a:buChar char="•"/>
             </a:pPr>
-            <a:endParaRPr lang="en-US" sz="1800" b="0" dirty="0"/>
+            <a:endParaRPr lang="en-US" sz="1800" dirty="0"/>
           </a:p>
           <a:p>
             <a:pPr marL="285750" indent="-285750">
@@ -5968,30 +6235,30 @@
               <a:buChar char="•"/>
             </a:pPr>
             <a:r>
-              <a:rPr lang="en-US" sz="1800" b="0" dirty="0" smtClean="0"/>
+              <a:rPr lang="en-US" sz="1800" dirty="0" smtClean="0"/>
               <a:t>Memento </a:t>
             </a:r>
             <a:r>
-              <a:rPr lang="en-US" sz="1800" b="0" dirty="0" err="1" smtClean="0"/>
+              <a:rPr lang="en-US" sz="1800" dirty="0" err="1" smtClean="0"/>
               <a:t>implementiert</a:t>
             </a:r>
             <a:r>
-              <a:rPr lang="en-US" sz="1800" b="0" dirty="0" smtClean="0"/>
+              <a:rPr lang="en-US" sz="1800" dirty="0" smtClean="0"/>
               <a:t> </a:t>
             </a:r>
             <a:r>
-              <a:rPr lang="en-US" sz="1800" b="0" dirty="0" err="1" smtClean="0"/>
+              <a:rPr lang="en-US" sz="1800" dirty="0" err="1" smtClean="0"/>
               <a:t>als</a:t>
             </a:r>
             <a:r>
-              <a:rPr lang="en-US" sz="1800" b="0" dirty="0" smtClean="0"/>
+              <a:rPr lang="en-US" sz="1800" dirty="0" smtClean="0"/>
               <a:t> interne </a:t>
             </a:r>
             <a:r>
-              <a:rPr lang="en-US" sz="1800" b="0" dirty="0" err="1" smtClean="0"/>
+              <a:rPr lang="en-US" sz="1800" dirty="0" err="1" smtClean="0"/>
               <a:t>Klasse</a:t>
             </a:r>
-            <a:endParaRPr lang="en-US" sz="1800" b="0" dirty="0" smtClean="0"/>
+            <a:endParaRPr lang="en-US" sz="1800" dirty="0" smtClean="0"/>
           </a:p>
         </p:txBody>
       </p:sp>
@@ -6140,6 +6407,13 @@
   <p:clrMapOvr>
     <a:masterClrMapping/>
   </p:clrMapOvr>
+  <p:timing>
+    <p:tnLst>
+      <p:par>
+        <p:cTn xmlns:p14="http://schemas.microsoft.com/office/powerpoint/2010/main" id="1" dur="indefinite" restart="never" nodeType="tmRoot"/>
+      </p:par>
+    </p:tnLst>
+  </p:timing>
 </p:sld>
 </file>
 
@@ -6177,7 +6451,7 @@
           <a:p>
             <a:r>
               <a:rPr lang="en-US" dirty="0" smtClean="0"/>
-              <a:t>Memento: Things to consider</a:t>
+              <a:t>Memento: Checklist</a:t>
             </a:r>
             <a:endParaRPr lang="en-US" dirty="0"/>
           </a:p>
@@ -6195,91 +6469,300 @@
         </p:nvSpPr>
         <p:spPr/>
         <p:txBody>
-          <a:bodyPr>
-            <a:normAutofit/>
-          </a:bodyPr>
+          <a:bodyPr/>
           <a:lstStyle/>
           <a:p>
-            <a:pPr marL="285750" indent="-285750">
-              <a:buFont typeface="Arial"/>
-              <a:buChar char="•"/>
+            <a:pPr marL="342900" indent="-342900">
+              <a:buFont typeface="+mj-lt"/>
+              <a:buAutoNum type="arabicPeriod"/>
             </a:pPr>
-            <a:endParaRPr lang="en-US" sz="1800" b="0" dirty="0" smtClean="0"/>
-          </a:p>
-          <a:p>
-            <a:pPr marL="285750" indent="-285750">
-              <a:buFont typeface="Arial"/>
-              <a:buChar char="•"/>
+            <a:r>
+              <a:rPr lang="en-US" dirty="0" err="1" smtClean="0"/>
+              <a:t>Rollen</a:t>
+            </a:r>
+            <a:r>
+              <a:rPr lang="en-US" dirty="0" smtClean="0"/>
+              <a:t> von “Caretaker” und “Originator” </a:t>
+            </a:r>
+            <a:r>
+              <a:rPr lang="en-US" dirty="0" err="1" smtClean="0"/>
+              <a:t>definieren</a:t>
+            </a:r>
+            <a:endParaRPr lang="en-US" dirty="0" smtClean="0"/>
+          </a:p>
+          <a:p>
+            <a:pPr marL="342900" indent="-342900">
+              <a:buFont typeface="+mj-lt"/>
+              <a:buAutoNum type="arabicPeriod"/>
             </a:pPr>
             <a:r>
-              <a:rPr lang="en-US" sz="1800" b="0" dirty="0" err="1" smtClean="0"/>
-              <a:t>Interner</a:t>
-            </a:r>
-            <a:r>
-              <a:rPr lang="en-US" sz="1800" b="0" dirty="0" smtClean="0"/>
-              <a:t> Status = </a:t>
-            </a:r>
-            <a:r>
-              <a:rPr lang="en-US" sz="1800" b="0" dirty="0" err="1" smtClean="0"/>
-              <a:t>Objekt</a:t>
-            </a:r>
-            <a:r>
-              <a:rPr lang="en-US" sz="1800" b="0" dirty="0" smtClean="0"/>
+              <a:rPr lang="en-US" dirty="0" smtClean="0"/>
+              <a:t>Memento-</a:t>
+            </a:r>
+            <a:r>
+              <a:rPr lang="en-US" dirty="0" err="1" smtClean="0"/>
+              <a:t>Klasse</a:t>
+            </a:r>
+            <a:r>
+              <a:rPr lang="en-US" dirty="0" smtClean="0"/>
+              <a:t> (</a:t>
+            </a:r>
+            <a:r>
+              <a:rPr lang="en-US" dirty="0" err="1" smtClean="0"/>
+              <a:t>als</a:t>
+            </a:r>
+            <a:r>
+              <a:rPr lang="en-US" dirty="0" smtClean="0"/>
+              <a:t> interne </a:t>
+            </a:r>
+            <a:r>
+              <a:rPr lang="en-US" dirty="0" err="1" smtClean="0"/>
+              <a:t>Klasse</a:t>
+            </a:r>
+            <a:r>
+              <a:rPr lang="en-US" dirty="0" smtClean="0"/>
+              <a:t>) </a:t>
+            </a:r>
+            <a:r>
+              <a:rPr lang="en-US" dirty="0" err="1" smtClean="0"/>
+              <a:t>definieren</a:t>
+            </a:r>
+            <a:endParaRPr lang="en-US" dirty="0" smtClean="0"/>
+          </a:p>
+          <a:p>
+            <a:pPr marL="342900" indent="-342900">
+              <a:buFont typeface="+mj-lt"/>
+              <a:buAutoNum type="arabicPeriod"/>
+            </a:pPr>
+            <a:endParaRPr lang="en-US" dirty="0" smtClean="0"/>
+          </a:p>
+          <a:p>
+            <a:pPr marL="342900" indent="-342900">
+              <a:buFont typeface="+mj-lt"/>
+              <a:buAutoNum type="arabicPeriod"/>
+            </a:pPr>
+            <a:r>
+              <a:rPr lang="en-US" dirty="0" smtClean="0"/>
+              <a:t>Caretaker </a:t>
+            </a:r>
+            <a:r>
+              <a:rPr lang="en-US" dirty="0" err="1" smtClean="0"/>
+              <a:t>entscheidet</a:t>
+            </a:r>
+            <a:r>
+              <a:rPr lang="en-US" dirty="0" smtClean="0"/>
+              <a:t>, </a:t>
+            </a:r>
+            <a:r>
+              <a:rPr lang="en-US" dirty="0" err="1" smtClean="0"/>
+              <a:t>wann</a:t>
+            </a:r>
+            <a:r>
+              <a:rPr lang="en-US" dirty="0" smtClean="0"/>
               <a:t> </a:t>
             </a:r>
             <a:r>
-              <a:rPr lang="en-US" sz="1800" b="0" dirty="0" smtClean="0">
-                <a:sym typeface="Wingdings"/>
-              </a:rPr>
-              <a:t> Clone!</a:t>
-            </a:r>
-          </a:p>
-          <a:p>
-            <a:pPr marL="285750" indent="-285750">
-              <a:buFont typeface="Arial"/>
-              <a:buChar char="•"/>
+              <a:rPr lang="en-US" dirty="0" err="1" smtClean="0"/>
+              <a:t>eine</a:t>
+            </a:r>
+            <a:r>
+              <a:rPr lang="en-US" dirty="0" smtClean="0"/>
+              <a:t> </a:t>
+            </a:r>
+            <a:r>
+              <a:rPr lang="en-US" dirty="0" err="1" smtClean="0"/>
+              <a:t>Speicherung</a:t>
+            </a:r>
+            <a:r>
+              <a:rPr lang="en-US" dirty="0" smtClean="0"/>
+              <a:t> </a:t>
+            </a:r>
+            <a:r>
+              <a:rPr lang="en-US" dirty="0" err="1" smtClean="0"/>
+              <a:t>stattfindet</a:t>
+            </a:r>
+            <a:endParaRPr lang="en-US" dirty="0" smtClean="0"/>
+          </a:p>
+          <a:p>
+            <a:pPr marL="342900" indent="-342900">
+              <a:buFont typeface="+mj-lt"/>
+              <a:buAutoNum type="arabicPeriod"/>
             </a:pPr>
-            <a:endParaRPr lang="en-US" sz="1800" b="0" dirty="0">
-              <a:sym typeface="Wingdings"/>
-            </a:endParaRPr>
-          </a:p>
-          <a:p>
-            <a:pPr marL="285750" indent="-285750">
-              <a:buFont typeface="Arial"/>
-              <a:buChar char="•"/>
+            <a:r>
+              <a:rPr lang="en-US" dirty="0" smtClean="0"/>
+              <a:t>Der Originator </a:t>
+            </a:r>
+            <a:r>
+              <a:rPr lang="en-US" dirty="0" err="1" smtClean="0"/>
+              <a:t>erstellt</a:t>
+            </a:r>
+            <a:r>
+              <a:rPr lang="en-US" dirty="0" smtClean="0"/>
+              <a:t> </a:t>
+            </a:r>
+            <a:r>
+              <a:rPr lang="en-US" dirty="0" err="1" smtClean="0"/>
+              <a:t>ein</a:t>
+            </a:r>
+            <a:r>
+              <a:rPr lang="en-US" dirty="0" smtClean="0"/>
+              <a:t> Memento und </a:t>
+            </a:r>
+            <a:r>
+              <a:rPr lang="en-US" dirty="0" err="1" smtClean="0"/>
+              <a:t>kopiert</a:t>
+            </a:r>
+            <a:r>
+              <a:rPr lang="en-US" dirty="0" smtClean="0"/>
+              <a:t> </a:t>
+            </a:r>
+            <a:r>
+              <a:rPr lang="en-US" dirty="0" err="1" smtClean="0"/>
+              <a:t>seinen</a:t>
+            </a:r>
+            <a:r>
+              <a:rPr lang="en-US" dirty="0" smtClean="0"/>
+              <a:t> Status in dieses</a:t>
+            </a:r>
+          </a:p>
+          <a:p>
+            <a:pPr marL="342900" indent="-342900">
+              <a:buFont typeface="+mj-lt"/>
+              <a:buAutoNum type="arabicPeriod"/>
             </a:pPr>
-            <a:endParaRPr lang="en-US" sz="1800" b="0" dirty="0" smtClean="0">
-              <a:sym typeface="Wingdings"/>
-            </a:endParaRPr>
-          </a:p>
-          <a:p>
-            <a:pPr marL="285750" indent="-285750">
-              <a:buFont typeface="Arial"/>
-              <a:buChar char="•"/>
+            <a:r>
+              <a:rPr lang="en-US" dirty="0" smtClean="0"/>
+              <a:t>Caretaker </a:t>
+            </a:r>
+            <a:r>
+              <a:rPr lang="en-US" dirty="0" err="1" smtClean="0"/>
+              <a:t>übernimmt</a:t>
+            </a:r>
+            <a:r>
+              <a:rPr lang="en-US" dirty="0" smtClean="0"/>
+              <a:t> das Memento</a:t>
+            </a:r>
+          </a:p>
+          <a:p>
+            <a:pPr marL="342900" indent="-342900">
+              <a:buFont typeface="+mj-lt"/>
+              <a:buAutoNum type="arabicPeriod"/>
             </a:pPr>
-            <a:endParaRPr lang="en-US" sz="1800" b="0" dirty="0">
-              <a:sym typeface="Wingdings"/>
-            </a:endParaRPr>
-          </a:p>
-          <a:p>
-            <a:pPr marL="285750" indent="-285750">
-              <a:buFont typeface="Arial"/>
-              <a:buChar char="•"/>
+            <a:endParaRPr lang="en-US" dirty="0" smtClean="0"/>
+          </a:p>
+          <a:p>
+            <a:pPr marL="342900" indent="-342900">
+              <a:buFont typeface="+mj-lt"/>
+              <a:buAutoNum type="arabicPeriod"/>
             </a:pPr>
-            <a:endParaRPr lang="en-US" sz="1800" b="0" dirty="0"/>
+            <a:r>
+              <a:rPr lang="en-US" dirty="0" smtClean="0"/>
+              <a:t>Caretaker </a:t>
+            </a:r>
+            <a:r>
+              <a:rPr lang="en-US" dirty="0" err="1" smtClean="0"/>
+              <a:t>weiss</a:t>
+            </a:r>
+            <a:r>
+              <a:rPr lang="en-US" dirty="0" smtClean="0"/>
+              <a:t>, </a:t>
+            </a:r>
+            <a:r>
+              <a:rPr lang="en-US" dirty="0" err="1" smtClean="0"/>
+              <a:t>wann</a:t>
+            </a:r>
+            <a:r>
+              <a:rPr lang="en-US" dirty="0" smtClean="0"/>
+              <a:t> </a:t>
+            </a:r>
+            <a:r>
+              <a:rPr lang="en-US" dirty="0" err="1" smtClean="0"/>
+              <a:t>ein</a:t>
+            </a:r>
+            <a:r>
+              <a:rPr lang="en-US" dirty="0" smtClean="0"/>
+              <a:t> “Undo” </a:t>
+            </a:r>
+            <a:r>
+              <a:rPr lang="en-US" dirty="0" err="1" smtClean="0"/>
+              <a:t>ausgeführt</a:t>
+            </a:r>
+            <a:r>
+              <a:rPr lang="en-US" dirty="0" smtClean="0"/>
+              <a:t> </a:t>
+            </a:r>
+            <a:r>
+              <a:rPr lang="en-US" dirty="0" err="1" smtClean="0"/>
+              <a:t>werden</a:t>
+            </a:r>
+            <a:r>
+              <a:rPr lang="en-US" dirty="0" smtClean="0"/>
+              <a:t> </a:t>
+            </a:r>
+            <a:r>
+              <a:rPr lang="en-US" dirty="0" err="1" smtClean="0"/>
+              <a:t>soll</a:t>
+            </a:r>
+            <a:endParaRPr lang="en-US" dirty="0" smtClean="0"/>
+          </a:p>
+          <a:p>
+            <a:pPr marL="342900" indent="-342900">
+              <a:buFont typeface="+mj-lt"/>
+              <a:buAutoNum type="arabicPeriod"/>
+            </a:pPr>
+            <a:r>
+              <a:rPr lang="en-US" dirty="0" smtClean="0"/>
+              <a:t>Originator </a:t>
+            </a:r>
+            <a:r>
+              <a:rPr lang="en-US" dirty="0" err="1" smtClean="0"/>
+              <a:t>setzt</a:t>
+            </a:r>
+            <a:r>
+              <a:rPr lang="en-US" dirty="0" smtClean="0"/>
+              <a:t> </a:t>
+            </a:r>
+            <a:r>
+              <a:rPr lang="en-US" dirty="0" err="1" smtClean="0"/>
+              <a:t>sich</a:t>
+            </a:r>
+            <a:r>
+              <a:rPr lang="en-US" dirty="0" smtClean="0"/>
+              <a:t> </a:t>
+            </a:r>
+            <a:r>
+              <a:rPr lang="en-US" dirty="0" err="1" smtClean="0"/>
+              <a:t>selbst</a:t>
+            </a:r>
+            <a:r>
+              <a:rPr lang="en-US" dirty="0" smtClean="0"/>
+              <a:t> </a:t>
+            </a:r>
+            <a:r>
+              <a:rPr lang="en-US" dirty="0" err="1" smtClean="0"/>
+              <a:t>zurück</a:t>
+            </a:r>
+            <a:endParaRPr lang="en-US" dirty="0"/>
           </a:p>
         </p:txBody>
       </p:sp>
     </p:spTree>
     <p:extLst>
       <p:ext uri="{BB962C8B-B14F-4D97-AF65-F5344CB8AC3E}">
-        <p14:creationId xmlns:p14="http://schemas.microsoft.com/office/powerpoint/2010/main" val="1531073117"/>
+        <p14:creationId xmlns:p14="http://schemas.microsoft.com/office/powerpoint/2010/main" val="3515839067"/>
       </p:ext>
     </p:extLst>
   </p:cSld>
   <p:clrMapOvr>
     <a:masterClrMapping/>
   </p:clrMapOvr>
+  <p:timing>
+    <p:tnLst>
+      <p:par>
+        <p:cTn xmlns:p14="http://schemas.microsoft.com/office/powerpoint/2010/main" id="1" dur="indefinite" restart="never" nodeType="tmRoot"/>
+      </p:par>
+    </p:tnLst>
+  </p:timing>
 </p:sld>
 </file>
 
@@ -6317,6 +6800,223 @@
           <a:p>
             <a:r>
               <a:rPr lang="en-US" dirty="0" smtClean="0"/>
+              <a:t>Memento: </a:t>
+            </a:r>
+            <a:r>
+              <a:rPr lang="en-US" dirty="0" smtClean="0"/>
+              <a:t>STOLPERSTEINE</a:t>
+            </a:r>
+            <a:endParaRPr lang="en-US" dirty="0"/>
+          </a:p>
+        </p:txBody>
+      </p:sp>
+      <p:sp>
+        <p:nvSpPr>
+          <p:cNvPr id="3" name="Text Placeholder 2"/>
+          <p:cNvSpPr>
+            <a:spLocks noGrp="1"/>
+          </p:cNvSpPr>
+          <p:nvPr>
+            <p:ph type="body" sz="quarter" idx="13"/>
+          </p:nvPr>
+        </p:nvSpPr>
+        <p:spPr/>
+        <p:txBody>
+          <a:bodyPr>
+            <a:normAutofit/>
+          </a:bodyPr>
+          <a:lstStyle/>
+          <a:p>
+            <a:pPr marL="285750" indent="-285750">
+              <a:buFont typeface="Arial"/>
+              <a:buChar char="•"/>
+            </a:pPr>
+            <a:endParaRPr lang="en-US" sz="1800" dirty="0" smtClean="0"/>
+          </a:p>
+          <a:p>
+            <a:pPr marL="285750" indent="-285750">
+              <a:buFont typeface="Arial"/>
+              <a:buChar char="•"/>
+            </a:pPr>
+            <a:r>
+              <a:rPr lang="en-US" sz="1800" dirty="0" err="1" smtClean="0"/>
+              <a:t>Interner</a:t>
+            </a:r>
+            <a:r>
+              <a:rPr lang="en-US" sz="1800" dirty="0" smtClean="0"/>
+              <a:t> Status = </a:t>
+            </a:r>
+            <a:r>
+              <a:rPr lang="en-US" sz="1800" dirty="0" err="1" smtClean="0"/>
+              <a:t>Objekt</a:t>
+            </a:r>
+            <a:r>
+              <a:rPr lang="en-US" sz="1800" dirty="0" smtClean="0"/>
+              <a:t> </a:t>
+            </a:r>
+            <a:r>
+              <a:rPr lang="en-US" sz="1800" dirty="0" smtClean="0">
+                <a:sym typeface="Wingdings"/>
+              </a:rPr>
+              <a:t> Clone!</a:t>
+            </a:r>
+          </a:p>
+          <a:p>
+            <a:pPr marL="285750" indent="-285750">
+              <a:buFont typeface="Arial"/>
+              <a:buChar char="•"/>
+            </a:pPr>
+            <a:endParaRPr lang="en-US" sz="1800" dirty="0">
+              <a:sym typeface="Wingdings"/>
+            </a:endParaRPr>
+          </a:p>
+          <a:p>
+            <a:pPr marL="285750" indent="-285750">
+              <a:buFont typeface="Arial"/>
+              <a:buChar char="•"/>
+            </a:pPr>
+            <a:r>
+              <a:rPr lang="en-US" sz="1800" dirty="0" smtClean="0">
+                <a:sym typeface="Wingdings"/>
+              </a:rPr>
+              <a:t>“Undo-</a:t>
+            </a:r>
+            <a:r>
+              <a:rPr lang="en-US" sz="1800" dirty="0" err="1" smtClean="0">
+                <a:sym typeface="Wingdings"/>
+              </a:rPr>
+              <a:t>Funktion</a:t>
+            </a:r>
+            <a:r>
+              <a:rPr lang="en-US" sz="1800" dirty="0" smtClean="0">
+                <a:sym typeface="Wingdings"/>
+              </a:rPr>
+              <a:t>” </a:t>
+            </a:r>
+            <a:r>
+              <a:rPr lang="en-US" sz="1800" dirty="0" err="1" smtClean="0">
+                <a:sym typeface="Wingdings"/>
+              </a:rPr>
+              <a:t>ist</a:t>
+            </a:r>
+            <a:r>
+              <a:rPr lang="en-US" sz="1800" dirty="0" smtClean="0">
+                <a:sym typeface="Wingdings"/>
+              </a:rPr>
+              <a:t> </a:t>
+            </a:r>
+            <a:r>
+              <a:rPr lang="en-US" sz="1800" dirty="0" smtClean="0">
+                <a:sym typeface="Wingdings"/>
+              </a:rPr>
+              <a:t>in </a:t>
+            </a:r>
+            <a:r>
+              <a:rPr lang="en-US" sz="1800" dirty="0" err="1" smtClean="0">
+                <a:sym typeface="Wingdings"/>
+              </a:rPr>
+              <a:t>einem</a:t>
+            </a:r>
+            <a:r>
+              <a:rPr lang="en-US" sz="1800" dirty="0" smtClean="0">
+                <a:sym typeface="Wingdings"/>
+              </a:rPr>
+              <a:t> Browser </a:t>
+            </a:r>
+            <a:r>
+              <a:rPr lang="en-US" sz="1800" dirty="0" err="1" smtClean="0">
+                <a:sym typeface="Wingdings"/>
+              </a:rPr>
+              <a:t>bereits</a:t>
+            </a:r>
+            <a:r>
+              <a:rPr lang="en-US" sz="1800" dirty="0" smtClean="0">
+                <a:sym typeface="Wingdings"/>
+              </a:rPr>
+              <a:t> </a:t>
+            </a:r>
+            <a:r>
+              <a:rPr lang="en-US" sz="1800" dirty="0" err="1" smtClean="0">
+                <a:sym typeface="Wingdings"/>
+              </a:rPr>
+              <a:t>implementiert</a:t>
+            </a:r>
+            <a:endParaRPr lang="en-US" sz="1800" dirty="0" smtClean="0">
+              <a:sym typeface="Wingdings"/>
+            </a:endParaRPr>
+          </a:p>
+          <a:p>
+            <a:pPr marL="285750" indent="-285750">
+              <a:buFont typeface="Arial"/>
+              <a:buChar char="•"/>
+            </a:pPr>
+            <a:endParaRPr lang="en-US" sz="1800" dirty="0">
+              <a:sym typeface="Wingdings"/>
+            </a:endParaRPr>
+          </a:p>
+          <a:p>
+            <a:pPr marL="285750" indent="-285750">
+              <a:buFont typeface="Arial"/>
+              <a:buChar char="•"/>
+            </a:pPr>
+            <a:endParaRPr lang="en-US" sz="1800" dirty="0"/>
+          </a:p>
+        </p:txBody>
+      </p:sp>
+    </p:spTree>
+    <p:extLst>
+      <p:ext uri="{BB962C8B-B14F-4D97-AF65-F5344CB8AC3E}">
+        <p14:creationId xmlns:p14="http://schemas.microsoft.com/office/powerpoint/2010/main" val="1531073117"/>
+      </p:ext>
+    </p:extLst>
+  </p:cSld>
+  <p:clrMapOvr>
+    <a:masterClrMapping/>
+  </p:clrMapOvr>
+  <p:timing>
+    <p:tnLst>
+      <p:par>
+        <p:cTn xmlns:p14="http://schemas.microsoft.com/office/powerpoint/2010/main" id="1" dur="indefinite" restart="never" nodeType="tmRoot"/>
+      </p:par>
+    </p:tnLst>
+  </p:timing>
+</p:sld>
+</file>
+
+<file path=ppt/slides/slide16.xml><?xml version="1.0" encoding="utf-8"?>
+<p:sld xmlns:a="http://schemas.openxmlformats.org/drawingml/2006/main" xmlns:r="http://schemas.openxmlformats.org/officeDocument/2006/relationships" xmlns:p="http://schemas.openxmlformats.org/presentationml/2006/main">
+  <p:cSld>
+    <p:spTree>
+      <p:nvGrpSpPr>
+        <p:cNvPr id="1" name=""/>
+        <p:cNvGrpSpPr/>
+        <p:nvPr/>
+      </p:nvGrpSpPr>
+      <p:grpSpPr>
+        <a:xfrm>
+          <a:off x="0" y="0"/>
+          <a:ext cx="0" cy="0"/>
+          <a:chOff x="0" y="0"/>
+          <a:chExt cx="0" cy="0"/>
+        </a:xfrm>
+      </p:grpSpPr>
+      <p:sp>
+        <p:nvSpPr>
+          <p:cNvPr id="2" name="Title 1"/>
+          <p:cNvSpPr>
+            <a:spLocks noGrp="1"/>
+          </p:cNvSpPr>
+          <p:nvPr>
+            <p:ph type="title"/>
+          </p:nvPr>
+        </p:nvSpPr>
+        <p:spPr/>
+        <p:txBody>
+          <a:bodyPr/>
+          <a:lstStyle/>
+          <a:p>
+            <a:r>
+              <a:rPr lang="en-US" dirty="0" smtClean="0"/>
               <a:t>Any questions?</a:t>
             </a:r>
             <a:endParaRPr lang="en-US" dirty="0"/>
@@ -6352,6 +7052,13 @@
   <p:clrMapOvr>
     <a:masterClrMapping/>
   </p:clrMapOvr>
+  <p:timing>
+    <p:tnLst>
+      <p:par>
+        <p:cTn xmlns:p14="http://schemas.microsoft.com/office/powerpoint/2010/main" id="1" dur="indefinite" restart="never" nodeType="tmRoot"/>
+      </p:par>
+    </p:tnLst>
+  </p:timing>
 </p:sld>
 </file>
 
@@ -6762,40 +7469,40 @@
           <a:lstStyle/>
           <a:p>
             <a:r>
-              <a:rPr lang="en-US" sz="1800" b="0" dirty="0" err="1" smtClean="0"/>
+              <a:rPr lang="en-US" sz="1800" dirty="0" err="1" smtClean="0"/>
               <a:t>Objekt</a:t>
             </a:r>
             <a:r>
-              <a:rPr lang="en-US" sz="1800" b="0" dirty="0" smtClean="0"/>
+              <a:rPr lang="en-US" sz="1800" dirty="0" smtClean="0"/>
               <a:t>, welches </a:t>
             </a:r>
             <a:r>
-              <a:rPr lang="en-US" sz="1800" b="0" dirty="0" err="1" smtClean="0"/>
+              <a:rPr lang="en-US" sz="1800" dirty="0" err="1" smtClean="0"/>
               <a:t>es</a:t>
             </a:r>
             <a:r>
-              <a:rPr lang="en-US" sz="1800" b="0" dirty="0" smtClean="0"/>
+              <a:rPr lang="en-US" sz="1800" dirty="0" smtClean="0"/>
               <a:t> </a:t>
             </a:r>
             <a:r>
-              <a:rPr lang="en-US" sz="1800" b="0" dirty="0" err="1" smtClean="0"/>
+              <a:rPr lang="en-US" sz="1800" dirty="0" err="1" smtClean="0"/>
               <a:t>zu</a:t>
             </a:r>
             <a:r>
-              <a:rPr lang="en-US" sz="1800" b="0" dirty="0" smtClean="0"/>
+              <a:rPr lang="en-US" sz="1800" dirty="0" smtClean="0"/>
               <a:t> </a:t>
             </a:r>
             <a:r>
-              <a:rPr lang="en-US" sz="1800" b="0" dirty="0" err="1" smtClean="0"/>
+              <a:rPr lang="en-US" sz="1800" dirty="0" err="1" smtClean="0"/>
               <a:t>verwalten</a:t>
             </a:r>
             <a:r>
-              <a:rPr lang="en-US" sz="1800" b="0" dirty="0" smtClean="0"/>
+              <a:rPr lang="en-US" sz="1800" dirty="0" smtClean="0"/>
               <a:t> gilt.</a:t>
             </a:r>
           </a:p>
           <a:p>
-            <a:endParaRPr lang="en-US" sz="1800" b="0" dirty="0"/>
+            <a:endParaRPr lang="en-US" sz="1800" dirty="0"/>
           </a:p>
           <a:p>
             <a:pPr marL="457200" indent="-457200">
@@ -6803,15 +7510,15 @@
               <a:buChar char="•"/>
             </a:pPr>
             <a:r>
-              <a:rPr lang="en-US" sz="1800" b="0" dirty="0" smtClean="0"/>
+              <a:rPr lang="en-US" sz="1800" dirty="0" smtClean="0"/>
               <a:t>Hat </a:t>
             </a:r>
             <a:r>
-              <a:rPr lang="en-US" sz="1800" b="0" dirty="0" err="1" smtClean="0"/>
+              <a:rPr lang="en-US" sz="1800" dirty="0" err="1" smtClean="0"/>
               <a:t>einen</a:t>
             </a:r>
             <a:r>
-              <a:rPr lang="en-US" sz="1800" b="0" dirty="0" smtClean="0"/>
+              <a:rPr lang="en-US" sz="1800" dirty="0" smtClean="0"/>
               <a:t> ‘state’</a:t>
             </a:r>
           </a:p>
@@ -6820,7 +7527,7 @@
               <a:buFont typeface="Arial"/>
               <a:buChar char="•"/>
             </a:pPr>
-            <a:endParaRPr lang="en-US" sz="1800" b="0" dirty="0" smtClean="0"/>
+            <a:endParaRPr lang="en-US" sz="1800" dirty="0" smtClean="0"/>
           </a:p>
           <a:p>
             <a:pPr marL="457200" indent="-457200">
@@ -6828,14 +7535,14 @@
               <a:buChar char="•"/>
             </a:pPr>
             <a:r>
-              <a:rPr lang="en-US" sz="1800" b="0" dirty="0" err="1" smtClean="0"/>
+              <a:rPr lang="en-US" sz="1800" dirty="0" err="1" smtClean="0"/>
               <a:t>Methoden</a:t>
             </a:r>
             <a:r>
-              <a:rPr lang="en-US" sz="1800" b="0" dirty="0" smtClean="0"/>
+              <a:rPr lang="en-US" sz="1800" dirty="0" smtClean="0"/>
               <a:t>:</a:t>
             </a:r>
-            <a:endParaRPr lang="en-US" sz="1800" b="0" dirty="0"/>
+            <a:endParaRPr lang="en-US" sz="1800" dirty="0"/>
           </a:p>
           <a:p>
             <a:pPr marL="0" indent="0"/>
@@ -7047,26 +7754,26 @@
           <a:lstStyle/>
           <a:p>
             <a:r>
-              <a:rPr lang="en-US" sz="1800" b="0" dirty="0" smtClean="0"/>
+              <a:rPr lang="en-US" sz="1800" dirty="0" smtClean="0"/>
               <a:t>Container, </a:t>
             </a:r>
             <a:r>
-              <a:rPr lang="en-US" sz="1800" b="0" dirty="0" err="1" smtClean="0"/>
+              <a:rPr lang="en-US" sz="1800" dirty="0" err="1" smtClean="0"/>
               <a:t>welcher</a:t>
             </a:r>
             <a:r>
-              <a:rPr lang="en-US" sz="1800" b="0" dirty="0" smtClean="0"/>
+              <a:rPr lang="en-US" sz="1800" dirty="0" smtClean="0"/>
               <a:t> den Status des Originators </a:t>
             </a:r>
             <a:r>
-              <a:rPr lang="en-US" sz="1800" b="0" dirty="0" err="1" smtClean="0"/>
+              <a:rPr lang="en-US" sz="1800" dirty="0" err="1" smtClean="0"/>
               <a:t>speichert</a:t>
             </a:r>
-            <a:endParaRPr lang="en-US" sz="1800" b="0" dirty="0" smtClean="0"/>
+            <a:endParaRPr lang="en-US" sz="1800" dirty="0" smtClean="0"/>
           </a:p>
           <a:p>
             <a:pPr marL="0" indent="0"/>
-            <a:endParaRPr lang="en-US" sz="1800" b="0" dirty="0" smtClean="0"/>
+            <a:endParaRPr lang="en-US" sz="1800" dirty="0" smtClean="0"/>
           </a:p>
           <a:p>
             <a:pPr marL="457200" indent="-457200">
@@ -7074,14 +7781,14 @@
               <a:buChar char="•"/>
             </a:pPr>
             <a:r>
-              <a:rPr lang="en-US" sz="1800" b="0" dirty="0" err="1" smtClean="0"/>
+              <a:rPr lang="en-US" sz="1800" dirty="0" err="1" smtClean="0"/>
               <a:t>Methoden</a:t>
             </a:r>
             <a:r>
-              <a:rPr lang="en-US" sz="1800" b="0" dirty="0" smtClean="0"/>
+              <a:rPr lang="en-US" sz="1800" dirty="0" smtClean="0"/>
               <a:t>:</a:t>
             </a:r>
-            <a:endParaRPr lang="en-US" sz="1800" b="0" dirty="0"/>
+            <a:endParaRPr lang="en-US" sz="1800" dirty="0"/>
           </a:p>
           <a:p>
             <a:pPr marL="0" indent="0"/>
@@ -7293,29 +8000,29 @@
           <a:lstStyle/>
           <a:p>
             <a:r>
-              <a:rPr lang="en-US" sz="1800" b="0" dirty="0" err="1" smtClean="0"/>
+              <a:rPr lang="en-US" sz="1800" dirty="0" err="1" smtClean="0"/>
               <a:t>Klasse</a:t>
             </a:r>
             <a:r>
-              <a:rPr lang="en-US" sz="1800" b="0" dirty="0" smtClean="0"/>
+              <a:rPr lang="en-US" sz="1800" dirty="0" smtClean="0"/>
               <a:t>, die den Undo-</a:t>
             </a:r>
             <a:r>
-              <a:rPr lang="en-US" sz="1800" b="0" dirty="0" err="1" smtClean="0"/>
+              <a:rPr lang="en-US" sz="1800" dirty="0" err="1" smtClean="0"/>
               <a:t>Befehl</a:t>
             </a:r>
             <a:r>
-              <a:rPr lang="en-US" sz="1800" b="0" dirty="0" smtClean="0"/>
+              <a:rPr lang="en-US" sz="1800" dirty="0" smtClean="0"/>
               <a:t> </a:t>
             </a:r>
             <a:r>
-              <a:rPr lang="en-US" sz="1800" b="0" dirty="0" err="1" smtClean="0"/>
+              <a:rPr lang="en-US" sz="1800" dirty="0" err="1" smtClean="0"/>
               <a:t>auslöst</a:t>
             </a:r>
-            <a:endParaRPr lang="en-US" sz="1800" b="0" dirty="0" smtClean="0"/>
-          </a:p>
-          <a:p>
-            <a:endParaRPr lang="en-US" sz="1800" b="0" dirty="0"/>
+            <a:endParaRPr lang="en-US" sz="1800" dirty="0" smtClean="0"/>
+          </a:p>
+          <a:p>
+            <a:endParaRPr lang="en-US" sz="1800" dirty="0"/>
           </a:p>
           <a:p>
             <a:pPr>
@@ -7323,29 +8030,29 @@
               <a:buChar char="•"/>
             </a:pPr>
             <a:r>
-              <a:rPr lang="en-US" sz="1800" b="0" dirty="0" smtClean="0"/>
+              <a:rPr lang="en-US" sz="1800" dirty="0" smtClean="0"/>
               <a:t>Hat </a:t>
             </a:r>
             <a:r>
-              <a:rPr lang="en-US" sz="1800" b="0" dirty="0" err="1" smtClean="0"/>
+              <a:rPr lang="en-US" sz="1800" dirty="0" err="1" smtClean="0"/>
               <a:t>Liste</a:t>
             </a:r>
             <a:r>
-              <a:rPr lang="en-US" sz="1800" b="0" dirty="0" smtClean="0"/>
+              <a:rPr lang="en-US" sz="1800" dirty="0" smtClean="0"/>
               <a:t> </a:t>
             </a:r>
             <a:r>
-              <a:rPr lang="en-US" sz="1800" b="0" dirty="0" err="1" smtClean="0"/>
+              <a:rPr lang="en-US" sz="1800" dirty="0" err="1" smtClean="0"/>
               <a:t>mit</a:t>
             </a:r>
             <a:r>
-              <a:rPr lang="en-US" sz="1800" b="0" dirty="0" smtClean="0"/>
+              <a:rPr lang="en-US" sz="1800" dirty="0" smtClean="0"/>
               <a:t> Mementos</a:t>
             </a:r>
           </a:p>
           <a:p>
             <a:pPr marL="0" indent="0"/>
-            <a:endParaRPr lang="en-US" sz="1800" b="0" dirty="0" smtClean="0"/>
+            <a:endParaRPr lang="en-US" sz="1800" dirty="0" smtClean="0"/>
           </a:p>
           <a:p>
             <a:pPr marL="457200" indent="-457200">
@@ -7353,14 +8060,14 @@
               <a:buChar char="•"/>
             </a:pPr>
             <a:r>
-              <a:rPr lang="en-US" sz="1800" b="0" dirty="0" err="1" smtClean="0"/>
+              <a:rPr lang="en-US" sz="1800" dirty="0" err="1" smtClean="0"/>
               <a:t>Methoden</a:t>
             </a:r>
             <a:r>
-              <a:rPr lang="en-US" sz="1800" b="0" dirty="0" smtClean="0"/>
+              <a:rPr lang="en-US" sz="1800" dirty="0" smtClean="0"/>
               <a:t>:</a:t>
             </a:r>
-            <a:endParaRPr lang="en-US" sz="1800" b="0" dirty="0"/>
+            <a:endParaRPr lang="en-US" sz="1800" dirty="0"/>
           </a:p>
           <a:p>
             <a:pPr marL="0" indent="0"/>
@@ -7563,10 +8270,6 @@
               <a:rPr lang="en-US" dirty="0" err="1" smtClean="0"/>
               <a:t>Mechanismen</a:t>
             </a:r>
-            <a:r>
-              <a:rPr lang="en-US" dirty="0" smtClean="0"/>
-              <a:t> (1)</a:t>
-            </a:r>
             <a:endParaRPr lang="en-US" dirty="0"/>
           </a:p>
         </p:txBody>
@@ -7589,15 +8292,15 @@
           <a:lstStyle/>
           <a:p>
             <a:r>
-              <a:rPr lang="en-US" sz="1800" b="0" dirty="0" smtClean="0"/>
+              <a:rPr lang="en-US" sz="1800" dirty="0" smtClean="0"/>
               <a:t>Status </a:t>
             </a:r>
             <a:r>
-              <a:rPr lang="en-US" sz="1800" b="0" dirty="0" err="1" smtClean="0"/>
+              <a:rPr lang="en-US" sz="1800" dirty="0" err="1" smtClean="0"/>
               <a:t>speichern</a:t>
             </a:r>
             <a:r>
-              <a:rPr lang="en-US" sz="1800" b="0" dirty="0" smtClean="0"/>
+              <a:rPr lang="en-US" sz="1800" dirty="0" smtClean="0"/>
               <a:t>:</a:t>
             </a:r>
           </a:p>
@@ -7607,23 +8310,23 @@
               <a:buAutoNum type="arabicPeriod"/>
             </a:pPr>
             <a:r>
-              <a:rPr lang="en-US" sz="1800" b="0" dirty="0" smtClean="0"/>
+              <a:rPr lang="en-US" sz="1800" dirty="0" smtClean="0"/>
               <a:t>Caretaker </a:t>
             </a:r>
             <a:r>
-              <a:rPr lang="en-US" sz="1800" b="0" dirty="0" err="1" smtClean="0"/>
+              <a:rPr lang="en-US" sz="1800" dirty="0" err="1" smtClean="0"/>
               <a:t>ruft</a:t>
             </a:r>
             <a:r>
-              <a:rPr lang="en-US" sz="1800" b="0" dirty="0" smtClean="0"/>
+              <a:rPr lang="en-US" sz="1800" dirty="0" smtClean="0"/>
               <a:t> “</a:t>
             </a:r>
             <a:r>
-              <a:rPr lang="en-US" sz="1800" b="0" dirty="0" err="1" smtClean="0"/>
+              <a:rPr lang="en-US" sz="1800" dirty="0" err="1" smtClean="0"/>
               <a:t>createMemento</a:t>
             </a:r>
             <a:r>
-              <a:rPr lang="en-US" sz="1800" b="0" dirty="0" smtClean="0"/>
+              <a:rPr lang="en-US" sz="1800" dirty="0" smtClean="0"/>
               <a:t>()” des Originators auf</a:t>
             </a:r>
           </a:p>
@@ -7633,39 +8336,39 @@
               <a:buAutoNum type="arabicPeriod"/>
             </a:pPr>
             <a:r>
-              <a:rPr lang="en-US" sz="1800" b="0" dirty="0" smtClean="0"/>
+              <a:rPr lang="en-US" sz="1800" dirty="0" smtClean="0"/>
               <a:t>Originator </a:t>
             </a:r>
             <a:r>
-              <a:rPr lang="en-US" sz="1800" b="0" dirty="0" err="1" smtClean="0"/>
+              <a:rPr lang="en-US" sz="1800" dirty="0" err="1" smtClean="0"/>
               <a:t>erstellt</a:t>
             </a:r>
             <a:r>
-              <a:rPr lang="en-US" sz="1800" b="0" dirty="0" smtClean="0"/>
+              <a:rPr lang="en-US" sz="1800" dirty="0" smtClean="0"/>
               <a:t> </a:t>
             </a:r>
             <a:r>
-              <a:rPr lang="en-US" sz="1800" b="0" dirty="0" err="1" smtClean="0"/>
+              <a:rPr lang="en-US" sz="1800" dirty="0" err="1" smtClean="0"/>
               <a:t>ein</a:t>
             </a:r>
             <a:r>
-              <a:rPr lang="en-US" sz="1800" b="0" dirty="0" smtClean="0"/>
+              <a:rPr lang="en-US" sz="1800" dirty="0" smtClean="0"/>
               <a:t> Memento </a:t>
             </a:r>
             <a:r>
-              <a:rPr lang="en-US" sz="1800" b="0" dirty="0" err="1" smtClean="0"/>
+              <a:rPr lang="en-US" sz="1800" dirty="0" err="1" smtClean="0"/>
               <a:t>mit</a:t>
             </a:r>
             <a:r>
-              <a:rPr lang="en-US" sz="1800" b="0" dirty="0" smtClean="0"/>
+              <a:rPr lang="en-US" sz="1800" dirty="0" smtClean="0"/>
               <a:t> </a:t>
             </a:r>
             <a:r>
-              <a:rPr lang="en-US" sz="1800" b="0" dirty="0" err="1" smtClean="0"/>
+              <a:rPr lang="en-US" sz="1800" dirty="0" err="1" smtClean="0"/>
               <a:t>seinem</a:t>
             </a:r>
             <a:r>
-              <a:rPr lang="en-US" sz="1800" b="0" dirty="0" smtClean="0"/>
+              <a:rPr lang="en-US" sz="1800" dirty="0" smtClean="0"/>
               <a:t> Status</a:t>
             </a:r>
           </a:p>
@@ -7675,41 +8378,41 @@
               <a:buAutoNum type="arabicPeriod"/>
             </a:pPr>
             <a:r>
-              <a:rPr lang="en-US" sz="1800" b="0" dirty="0" smtClean="0"/>
+              <a:rPr lang="en-US" sz="1800" dirty="0" smtClean="0"/>
               <a:t>Originator </a:t>
             </a:r>
             <a:r>
-              <a:rPr lang="en-US" sz="1800" b="0" dirty="0" err="1" smtClean="0"/>
+              <a:rPr lang="en-US" sz="1800" dirty="0" err="1" smtClean="0"/>
               <a:t>gibt</a:t>
             </a:r>
             <a:r>
-              <a:rPr lang="en-US" sz="1800" b="0" dirty="0" smtClean="0"/>
+              <a:rPr lang="en-US" sz="1800" dirty="0" smtClean="0"/>
               <a:t> dieses Memento an den Caretaker </a:t>
             </a:r>
             <a:r>
-              <a:rPr lang="en-US" sz="1800" b="0" dirty="0" err="1" smtClean="0"/>
+              <a:rPr lang="en-US" sz="1800" dirty="0" err="1" smtClean="0"/>
               <a:t>zurück</a:t>
             </a:r>
-            <a:endParaRPr lang="en-US" sz="1800" b="0" dirty="0" smtClean="0"/>
+            <a:endParaRPr lang="en-US" sz="1800" dirty="0" smtClean="0"/>
           </a:p>
           <a:p>
             <a:pPr marL="342900" indent="-342900">
               <a:buFont typeface="+mj-lt"/>
               <a:buAutoNum type="arabicPeriod"/>
             </a:pPr>
-            <a:endParaRPr lang="en-US" sz="1800" b="0" dirty="0"/>
-          </a:p>
-          <a:p>
-            <a:r>
-              <a:rPr lang="en-US" sz="1800" b="0" dirty="0" smtClean="0"/>
+            <a:endParaRPr lang="en-US" sz="1800" dirty="0"/>
+          </a:p>
+          <a:p>
+            <a:r>
+              <a:rPr lang="en-US" sz="1800" dirty="0" smtClean="0"/>
               <a:t>Status </a:t>
             </a:r>
             <a:r>
-              <a:rPr lang="en-US" sz="1800" b="0" dirty="0" err="1" smtClean="0"/>
+              <a:rPr lang="en-US" sz="1800" dirty="0" err="1" smtClean="0"/>
               <a:t>zurücksetzen</a:t>
             </a:r>
             <a:r>
-              <a:rPr lang="en-US" sz="1800" b="0" dirty="0" smtClean="0"/>
+              <a:rPr lang="en-US" sz="1800" dirty="0" smtClean="0"/>
               <a:t> (Undo):</a:t>
             </a:r>
           </a:p>
@@ -7719,23 +8422,23 @@
               <a:buAutoNum type="arabicPeriod"/>
             </a:pPr>
             <a:r>
-              <a:rPr lang="en-US" sz="1800" b="0" dirty="0" smtClean="0"/>
+              <a:rPr lang="en-US" sz="1800" dirty="0" smtClean="0"/>
               <a:t>Caretaker </a:t>
             </a:r>
             <a:r>
-              <a:rPr lang="en-US" sz="1800" b="0" dirty="0" err="1" smtClean="0"/>
+              <a:rPr lang="en-US" sz="1800" dirty="0" err="1" smtClean="0"/>
               <a:t>ruft</a:t>
             </a:r>
             <a:r>
-              <a:rPr lang="en-US" sz="1800" b="0" dirty="0" smtClean="0"/>
+              <a:rPr lang="en-US" sz="1800" dirty="0" smtClean="0"/>
               <a:t> “</a:t>
             </a:r>
             <a:r>
-              <a:rPr lang="en-US" sz="1800" b="0" dirty="0" err="1" smtClean="0"/>
+              <a:rPr lang="en-US" sz="1800" dirty="0" err="1" smtClean="0"/>
               <a:t>setMemento</a:t>
             </a:r>
             <a:r>
-              <a:rPr lang="en-US" sz="1800" b="0" dirty="0" smtClean="0"/>
+              <a:rPr lang="en-US" sz="1800" dirty="0" smtClean="0"/>
               <a:t>(Memento m)” des Originators auf</a:t>
             </a:r>
           </a:p>
@@ -7745,39 +8448,39 @@
               <a:buAutoNum type="arabicPeriod"/>
             </a:pPr>
             <a:r>
-              <a:rPr lang="en-US" sz="1800" b="0" dirty="0" smtClean="0"/>
+              <a:rPr lang="en-US" sz="1800" dirty="0" smtClean="0"/>
               <a:t>Originator </a:t>
             </a:r>
             <a:r>
-              <a:rPr lang="en-US" sz="1800" b="0" dirty="0" err="1" smtClean="0"/>
+              <a:rPr lang="en-US" sz="1800" dirty="0" err="1" smtClean="0"/>
               <a:t>setzt</a:t>
             </a:r>
             <a:r>
-              <a:rPr lang="en-US" sz="1800" b="0" dirty="0" smtClean="0"/>
+              <a:rPr lang="en-US" sz="1800" dirty="0" smtClean="0"/>
               <a:t> </a:t>
             </a:r>
             <a:r>
-              <a:rPr lang="en-US" sz="1800" b="0" dirty="0" err="1" smtClean="0"/>
+              <a:rPr lang="en-US" sz="1800" dirty="0" err="1" smtClean="0"/>
               <a:t>seinen</a:t>
             </a:r>
             <a:r>
-              <a:rPr lang="en-US" sz="1800" b="0" dirty="0" smtClean="0"/>
+              <a:rPr lang="en-US" sz="1800" dirty="0" smtClean="0"/>
               <a:t> </a:t>
             </a:r>
             <a:r>
-              <a:rPr lang="en-US" sz="1800" b="0" dirty="0" err="1" smtClean="0"/>
+              <a:rPr lang="en-US" sz="1800" dirty="0" err="1" smtClean="0"/>
               <a:t>internen</a:t>
             </a:r>
             <a:r>
-              <a:rPr lang="en-US" sz="1800" b="0" dirty="0" smtClean="0"/>
+              <a:rPr lang="en-US" sz="1800" dirty="0" smtClean="0"/>
               <a:t> Status auf den Status </a:t>
             </a:r>
             <a:r>
-              <a:rPr lang="en-US" sz="1800" b="0" dirty="0" err="1" smtClean="0"/>
+              <a:rPr lang="en-US" sz="1800" dirty="0" err="1" smtClean="0"/>
               <a:t>im</a:t>
             </a:r>
             <a:r>
-              <a:rPr lang="en-US" sz="1800" b="0" dirty="0" smtClean="0"/>
+              <a:rPr lang="en-US" sz="1800" dirty="0" smtClean="0"/>
               <a:t> Memento</a:t>
             </a:r>
           </a:p>
@@ -7865,15 +8568,15 @@
           <a:lstStyle/>
           <a:p>
             <a:r>
-              <a:rPr lang="en-US" sz="1800" b="0" dirty="0" smtClean="0"/>
+              <a:rPr lang="en-US" sz="1800" dirty="0" smtClean="0"/>
               <a:t>Caretaker hat </a:t>
             </a:r>
             <a:r>
-              <a:rPr lang="en-US" sz="1800" b="0" dirty="0" err="1" smtClean="0"/>
+              <a:rPr lang="en-US" sz="1800" dirty="0" err="1" smtClean="0"/>
               <a:t>eingeschränktes</a:t>
             </a:r>
             <a:r>
-              <a:rPr lang="en-US" sz="1800" b="0" dirty="0" smtClean="0"/>
+              <a:rPr lang="en-US" sz="1800" dirty="0" smtClean="0"/>
               <a:t> Interface:</a:t>
             </a:r>
           </a:p>
@@ -7883,19 +8586,19 @@
               <a:buChar char="•"/>
             </a:pPr>
             <a:r>
-              <a:rPr lang="en-US" sz="1800" b="0" dirty="0" err="1" smtClean="0"/>
+              <a:rPr lang="en-US" sz="1800" dirty="0" err="1" smtClean="0"/>
               <a:t>Kein</a:t>
             </a:r>
             <a:r>
-              <a:rPr lang="en-US" sz="1800" b="0" dirty="0" smtClean="0"/>
+              <a:rPr lang="en-US" sz="1800" dirty="0" smtClean="0"/>
               <a:t> </a:t>
             </a:r>
             <a:r>
-              <a:rPr lang="en-US" sz="1800" b="0" dirty="0" err="1" smtClean="0"/>
+              <a:rPr lang="en-US" sz="1800" dirty="0" err="1" smtClean="0"/>
               <a:t>Zugriff</a:t>
             </a:r>
             <a:r>
-              <a:rPr lang="en-US" sz="1800" b="0" dirty="0" smtClean="0"/>
+              <a:rPr lang="en-US" sz="1800" dirty="0" smtClean="0"/>
               <a:t> auf das Memento</a:t>
             </a:r>
           </a:p>
@@ -7905,34 +8608,34 @@
               <a:buChar char="•"/>
             </a:pPr>
             <a:r>
-              <a:rPr lang="en-US" sz="1800" b="0" dirty="0" err="1" smtClean="0"/>
+              <a:rPr lang="en-US" sz="1800" dirty="0" err="1" smtClean="0"/>
               <a:t>Kann</a:t>
             </a:r>
             <a:r>
-              <a:rPr lang="en-US" sz="1800" b="0" dirty="0" smtClean="0"/>
+              <a:rPr lang="en-US" sz="1800" dirty="0" smtClean="0"/>
               <a:t> Memento </a:t>
             </a:r>
             <a:r>
-              <a:rPr lang="en-US" sz="1800" b="0" dirty="0" err="1" smtClean="0"/>
+              <a:rPr lang="en-US" sz="1800" dirty="0" err="1" smtClean="0"/>
               <a:t>nur</a:t>
             </a:r>
             <a:r>
-              <a:rPr lang="en-US" sz="1800" b="0" dirty="0" smtClean="0"/>
+              <a:rPr lang="en-US" sz="1800" dirty="0" smtClean="0"/>
               <a:t> </a:t>
             </a:r>
             <a:r>
-              <a:rPr lang="en-US" sz="1800" b="0" dirty="0" err="1" smtClean="0"/>
+              <a:rPr lang="en-US" sz="1800" dirty="0" err="1" smtClean="0"/>
               <a:t>weiterreichen</a:t>
             </a:r>
             <a:r>
-              <a:rPr lang="en-US" sz="1800" b="0" dirty="0" smtClean="0"/>
+              <a:rPr lang="en-US" sz="1800" dirty="0" smtClean="0"/>
               <a:t> / </a:t>
             </a:r>
             <a:r>
-              <a:rPr lang="en-US" sz="1800" b="0" dirty="0" err="1" smtClean="0"/>
+              <a:rPr lang="en-US" sz="1800" dirty="0" err="1" smtClean="0"/>
               <a:t>abspeichern</a:t>
             </a:r>
-            <a:endParaRPr lang="en-US" sz="1800" b="0" dirty="0" smtClean="0"/>
+            <a:endParaRPr lang="en-US" sz="1800" dirty="0" smtClean="0"/>
           </a:p>
           <a:p>
             <a:pPr marL="285750" indent="-285750">
@@ -7940,108 +8643,108 @@
               <a:buChar char="•"/>
             </a:pPr>
             <a:r>
-              <a:rPr lang="en-US" sz="1800" b="0" dirty="0" smtClean="0"/>
+              <a:rPr lang="en-US" sz="1800" dirty="0" smtClean="0"/>
               <a:t>Interne </a:t>
             </a:r>
             <a:r>
-              <a:rPr lang="en-US" sz="1800" b="0" dirty="0" err="1" smtClean="0"/>
+              <a:rPr lang="en-US" sz="1800" dirty="0" err="1" smtClean="0"/>
               <a:t>Daten</a:t>
             </a:r>
             <a:r>
-              <a:rPr lang="en-US" sz="1800" b="0" dirty="0" smtClean="0"/>
+              <a:rPr lang="en-US" sz="1800" dirty="0" smtClean="0"/>
               <a:t> </a:t>
             </a:r>
             <a:r>
-              <a:rPr lang="en-US" sz="1800" b="0" dirty="0" err="1" smtClean="0"/>
+              <a:rPr lang="en-US" sz="1800" dirty="0" err="1" smtClean="0"/>
               <a:t>bleiben</a:t>
             </a:r>
             <a:r>
-              <a:rPr lang="en-US" sz="1800" b="0" dirty="0" smtClean="0"/>
+              <a:rPr lang="en-US" sz="1800" dirty="0" smtClean="0"/>
               <a:t> </a:t>
             </a:r>
             <a:r>
-              <a:rPr lang="en-US" sz="1800" b="0" dirty="0" err="1" smtClean="0"/>
+              <a:rPr lang="en-US" sz="1800" dirty="0" err="1" smtClean="0"/>
               <a:t>geschützt</a:t>
             </a:r>
-            <a:endParaRPr lang="en-US" sz="1800" b="0" dirty="0" smtClean="0"/>
-          </a:p>
-          <a:p>
-            <a:endParaRPr lang="en-US" sz="1800" b="0" dirty="0" smtClean="0"/>
-          </a:p>
-          <a:p>
-            <a:r>
-              <a:rPr lang="en-US" sz="1800" b="0" dirty="0" err="1" smtClean="0"/>
+            <a:endParaRPr lang="en-US" sz="1800" dirty="0" smtClean="0"/>
+          </a:p>
+          <a:p>
+            <a:endParaRPr lang="en-US" sz="1800" dirty="0" smtClean="0"/>
+          </a:p>
+          <a:p>
+            <a:r>
+              <a:rPr lang="en-US" sz="1800" dirty="0" err="1" smtClean="0"/>
               <a:t>Allein</a:t>
             </a:r>
             <a:r>
-              <a:rPr lang="en-US" sz="1800" b="0" dirty="0" smtClean="0"/>
+              <a:rPr lang="en-US" sz="1800" dirty="0" smtClean="0"/>
               <a:t> </a:t>
             </a:r>
             <a:r>
-              <a:rPr lang="en-US" sz="1800" b="0" dirty="0"/>
+              <a:rPr lang="en-US" sz="1800" dirty="0"/>
               <a:t>der Originator hat </a:t>
             </a:r>
             <a:r>
-              <a:rPr lang="en-US" sz="1800" b="0" dirty="0" err="1"/>
+              <a:rPr lang="en-US" sz="1800" dirty="0" err="1"/>
               <a:t>vollen</a:t>
             </a:r>
             <a:r>
-              <a:rPr lang="en-US" sz="1800" b="0" dirty="0"/>
+              <a:rPr lang="en-US" sz="1800" dirty="0"/>
               <a:t> </a:t>
             </a:r>
             <a:r>
-              <a:rPr lang="en-US" sz="1800" b="0" dirty="0" err="1"/>
+              <a:rPr lang="en-US" sz="1800" dirty="0" err="1"/>
               <a:t>Zugriff</a:t>
             </a:r>
             <a:r>
-              <a:rPr lang="en-US" sz="1800" b="0" dirty="0"/>
+              <a:rPr lang="en-US" sz="1800" dirty="0"/>
               <a:t>, um </a:t>
             </a:r>
             <a:r>
-              <a:rPr lang="en-US" sz="1800" b="0" dirty="0" err="1"/>
+              <a:rPr lang="en-US" sz="1800" dirty="0" err="1"/>
               <a:t>seinen</a:t>
             </a:r>
             <a:r>
-              <a:rPr lang="en-US" sz="1800" b="0" dirty="0"/>
+              <a:rPr lang="en-US" sz="1800" dirty="0"/>
               <a:t> </a:t>
             </a:r>
             <a:r>
-              <a:rPr lang="en-US" sz="1800" b="0" dirty="0" err="1" smtClean="0"/>
+              <a:rPr lang="en-US" sz="1800" dirty="0" err="1" smtClean="0"/>
               <a:t>Zustand</a:t>
             </a:r>
             <a:r>
-              <a:rPr lang="en-US" sz="1800" b="0" dirty="0" smtClean="0"/>
+              <a:rPr lang="en-US" sz="1800" dirty="0" smtClean="0"/>
               <a:t> </a:t>
             </a:r>
             <a:r>
-              <a:rPr lang="en-US" sz="1800" b="0" dirty="0" err="1" smtClean="0"/>
+              <a:rPr lang="en-US" sz="1800" dirty="0" err="1" smtClean="0"/>
               <a:t>abzuspeichern</a:t>
             </a:r>
             <a:r>
-              <a:rPr lang="en-US" sz="1800" b="0" dirty="0" smtClean="0"/>
+              <a:rPr lang="en-US" sz="1800" dirty="0" smtClean="0"/>
               <a:t> </a:t>
             </a:r>
             <a:r>
-              <a:rPr lang="en-US" sz="1800" b="0" dirty="0" err="1"/>
+              <a:rPr lang="en-US" sz="1800" dirty="0" err="1"/>
               <a:t>bzw</a:t>
             </a:r>
             <a:r>
-              <a:rPr lang="en-US" sz="1800" b="0" dirty="0"/>
+              <a:rPr lang="en-US" sz="1800" dirty="0"/>
               <a:t>. Mementos </a:t>
             </a:r>
             <a:r>
-              <a:rPr lang="en-US" sz="1800" b="0" dirty="0" err="1"/>
+              <a:rPr lang="en-US" sz="1800" dirty="0" err="1"/>
               <a:t>Zustand</a:t>
             </a:r>
             <a:r>
-              <a:rPr lang="en-US" sz="1800" b="0" dirty="0"/>
+              <a:rPr lang="en-US" sz="1800" dirty="0"/>
               <a:t> </a:t>
             </a:r>
             <a:r>
-              <a:rPr lang="en-US" sz="1800" b="0" dirty="0" err="1"/>
+              <a:rPr lang="en-US" sz="1800" dirty="0" err="1"/>
               <a:t>auszulesen</a:t>
             </a:r>
-            <a:endParaRPr lang="en-US" sz="1800" b="0" dirty="0"/>
+            <a:endParaRPr lang="en-US" sz="1800" dirty="0"/>
           </a:p>
           <a:p>
             <a:pPr marL="285750" indent="-285750">
@@ -8049,19 +8752,19 @@
               <a:buChar char="•"/>
             </a:pPr>
             <a:r>
-              <a:rPr lang="en-US" sz="1800" b="0" dirty="0" err="1" smtClean="0"/>
+              <a:rPr lang="en-US" sz="1800" dirty="0" err="1" smtClean="0"/>
               <a:t>Begrenzt</a:t>
             </a:r>
             <a:r>
-              <a:rPr lang="en-US" sz="1800" b="0" dirty="0" smtClean="0"/>
+              <a:rPr lang="en-US" sz="1800" dirty="0" smtClean="0"/>
               <a:t> </a:t>
             </a:r>
             <a:r>
-              <a:rPr lang="en-US" sz="1800" b="0" dirty="0" err="1" smtClean="0"/>
+              <a:rPr lang="en-US" sz="1800" dirty="0" err="1" smtClean="0"/>
               <a:t>Komplexität</a:t>
             </a:r>
             <a:r>
-              <a:rPr lang="en-US" sz="1800" b="0" dirty="0" smtClean="0"/>
+              <a:rPr lang="en-US" sz="1800" dirty="0" smtClean="0"/>
               <a:t> des Originators</a:t>
             </a:r>
           </a:p>
@@ -8071,59 +8774,59 @@
               <a:buChar char="•"/>
             </a:pPr>
             <a:r>
-              <a:rPr lang="en-US" sz="1800" b="0" dirty="0" err="1" smtClean="0"/>
+              <a:rPr lang="en-US" sz="1800" dirty="0" err="1" smtClean="0"/>
               <a:t>Entlastet</a:t>
             </a:r>
             <a:r>
-              <a:rPr lang="en-US" sz="1800" b="0" dirty="0" smtClean="0"/>
+              <a:rPr lang="en-US" sz="1800" dirty="0" smtClean="0"/>
               <a:t> Originator </a:t>
             </a:r>
             <a:r>
-              <a:rPr lang="en-US" sz="1800" b="0" dirty="0" err="1" smtClean="0"/>
+              <a:rPr lang="en-US" sz="1800" dirty="0" err="1" smtClean="0"/>
               <a:t>vom</a:t>
             </a:r>
             <a:r>
-              <a:rPr lang="en-US" sz="1800" b="0" dirty="0" smtClean="0"/>
+              <a:rPr lang="en-US" sz="1800" dirty="0" smtClean="0"/>
               <a:t> </a:t>
             </a:r>
             <a:r>
-              <a:rPr lang="en-US" sz="1800" b="0" dirty="0" err="1" smtClean="0"/>
+              <a:rPr lang="en-US" sz="1800" dirty="0" err="1" smtClean="0"/>
               <a:t>Speichern</a:t>
             </a:r>
             <a:r>
-              <a:rPr lang="en-US" sz="1800" b="0" dirty="0" smtClean="0"/>
+              <a:rPr lang="en-US" sz="1800" dirty="0" smtClean="0"/>
               <a:t> seiner </a:t>
             </a:r>
             <a:r>
-              <a:rPr lang="en-US" sz="1800" b="0" dirty="0" err="1" smtClean="0"/>
+              <a:rPr lang="en-US" sz="1800" dirty="0" err="1" smtClean="0"/>
               <a:t>eigenen</a:t>
             </a:r>
             <a:r>
-              <a:rPr lang="en-US" sz="1800" b="0" dirty="0" smtClean="0"/>
+              <a:rPr lang="en-US" sz="1800" dirty="0" smtClean="0"/>
               <a:t> </a:t>
             </a:r>
             <a:r>
-              <a:rPr lang="en-US" sz="1800" b="0" dirty="0" err="1" smtClean="0"/>
+              <a:rPr lang="en-US" sz="1800" dirty="0" err="1" smtClean="0"/>
               <a:t>Zustände</a:t>
             </a:r>
-            <a:endParaRPr lang="en-US" sz="1800" b="0" dirty="0"/>
+            <a:endParaRPr lang="en-US" sz="1800" dirty="0"/>
           </a:p>
           <a:p>
             <a:pPr marL="285750" indent="-285750">
               <a:buFont typeface="Arial"/>
               <a:buChar char="•"/>
             </a:pPr>
-            <a:endParaRPr lang="en-US" sz="1800" b="0" dirty="0" smtClean="0"/>
+            <a:endParaRPr lang="en-US" sz="1800" dirty="0" smtClean="0"/>
           </a:p>
           <a:p>
             <a:pPr marL="285750" indent="-285750">
               <a:buFont typeface="Arial"/>
               <a:buChar char="•"/>
             </a:pPr>
-            <a:endParaRPr lang="en-US" sz="1800" b="0" dirty="0"/>
-          </a:p>
-          <a:p>
-            <a:endParaRPr lang="en-US" sz="1800" b="0" dirty="0"/>
+            <a:endParaRPr lang="en-US" sz="1800" dirty="0"/>
+          </a:p>
+          <a:p>
+            <a:endParaRPr lang="en-US" sz="1800" dirty="0"/>
           </a:p>
         </p:txBody>
       </p:sp>

</xml_diff>